<commit_message>
Article Forecast menu changed, manual updated
</commit_message>
<xml_diff>
--- a/src/assets/ADFUserManual.pptx
+++ b/src/assets/ADFUserManual.pptx
@@ -7,25 +7,21 @@
     <p:sldMasterId id="2147483720" r:id="rId3"/>
   </p:sldMasterIdLst>
   <p:notesMasterIdLst>
-    <p:notesMasterId r:id="rId12"/>
+    <p:notesMasterId r:id="rId8"/>
   </p:notesMasterIdLst>
   <p:handoutMasterIdLst>
-    <p:handoutMasterId r:id="rId13"/>
+    <p:handoutMasterId r:id="rId9"/>
   </p:handoutMasterIdLst>
   <p:sldIdLst>
     <p:sldId id="256" r:id="rId4"/>
-    <p:sldId id="257" r:id="rId5"/>
-    <p:sldId id="258" r:id="rId6"/>
-    <p:sldId id="259" r:id="rId7"/>
-    <p:sldId id="260" r:id="rId8"/>
-    <p:sldId id="261" r:id="rId9"/>
-    <p:sldId id="262" r:id="rId10"/>
-    <p:sldId id="263" r:id="rId11"/>
+    <p:sldId id="260" r:id="rId5"/>
+    <p:sldId id="264" r:id="rId6"/>
+    <p:sldId id="263" r:id="rId7"/>
   </p:sldIdLst>
   <p:sldSz cx="12192000" cy="6858000"/>
   <p:notesSz cx="6858000" cy="9144000"/>
   <p:custDataLst>
-    <p:tags r:id="rId14"/>
+    <p:tags r:id="rId10"/>
   </p:custDataLst>
   <p:defaultTextStyle>
     <a:defPPr lvl="0">
@@ -149,6 +145,331 @@
 </p:presentation>
 </file>
 
+<file path=ppt/revisionInfo.xml><?xml version="1.0" encoding="utf-8"?>
+<p1510:revInfo xmlns:a="http://schemas.openxmlformats.org/drawingml/2006/main" xmlns:r="http://schemas.openxmlformats.org/officeDocument/2006/relationships" xmlns:p1510="http://schemas.microsoft.com/office/powerpoint/2015/10/main">
+  <p1510:revLst>
+    <p1510:client id="{31C47D4D-CA6D-47D6-B080-312CAD91072A}" v="4" dt="2022-05-23T12:10:56.660"/>
+  </p1510:revLst>
+</p1510:revInfo>
+</file>
+
+<file path=ppt/changesInfos/changesInfo1.xml><?xml version="1.0" encoding="utf-8"?>
+<pc:chgInfo xmlns:a="http://schemas.openxmlformats.org/drawingml/2006/main" xmlns:r="http://schemas.openxmlformats.org/officeDocument/2006/relationships" xmlns:ac="http://schemas.microsoft.com/office/drawing/2013/main/command" xmlns:pc="http://schemas.microsoft.com/office/powerpoint/2013/main/command">
+  <pc:docChgLst>
+    <pc:chgData name="Haug, Saskia (IISM)" userId="e2f6ae4e-27f4-4197-b694-f80a4aee0b95" providerId="ADAL" clId="{31C47D4D-CA6D-47D6-B080-312CAD91072A}"/>
+    <pc:docChg chg="undo redo custSel addSld delSld modSld sldOrd">
+      <pc:chgData name="Haug, Saskia (IISM)" userId="e2f6ae4e-27f4-4197-b694-f80a4aee0b95" providerId="ADAL" clId="{31C47D4D-CA6D-47D6-B080-312CAD91072A}" dt="2022-05-23T12:16:43.508" v="1131" actId="14100"/>
+      <pc:docMkLst>
+        <pc:docMk/>
+      </pc:docMkLst>
+      <pc:sldChg chg="addSp delSp modSp mod">
+        <pc:chgData name="Haug, Saskia (IISM)" userId="e2f6ae4e-27f4-4197-b694-f80a4aee0b95" providerId="ADAL" clId="{31C47D4D-CA6D-47D6-B080-312CAD91072A}" dt="2022-05-23T12:16:43.508" v="1131" actId="14100"/>
+        <pc:sldMkLst>
+          <pc:docMk/>
+          <pc:sldMk cId="2690026751" sldId="256"/>
+        </pc:sldMkLst>
+        <pc:spChg chg="mod">
+          <ac:chgData name="Haug, Saskia (IISM)" userId="e2f6ae4e-27f4-4197-b694-f80a4aee0b95" providerId="ADAL" clId="{31C47D4D-CA6D-47D6-B080-312CAD91072A}" dt="2022-05-23T12:16:43.508" v="1131" actId="14100"/>
+          <ac:spMkLst>
+            <pc:docMk/>
+            <pc:sldMk cId="2690026751" sldId="256"/>
+            <ac:spMk id="4" creationId="{DE079226-490F-408D-B92C-ADDE0AD05252}"/>
+          </ac:spMkLst>
+        </pc:spChg>
+        <pc:spChg chg="mod">
+          <ac:chgData name="Haug, Saskia (IISM)" userId="e2f6ae4e-27f4-4197-b694-f80a4aee0b95" providerId="ADAL" clId="{31C47D4D-CA6D-47D6-B080-312CAD91072A}" dt="2022-05-23T09:49:24.587" v="329" actId="14100"/>
+          <ac:spMkLst>
+            <pc:docMk/>
+            <pc:sldMk cId="2690026751" sldId="256"/>
+            <ac:spMk id="8" creationId="{1D5222AE-B652-4EBB-9520-69A61FA652FA}"/>
+          </ac:spMkLst>
+        </pc:spChg>
+        <pc:spChg chg="del">
+          <ac:chgData name="Haug, Saskia (IISM)" userId="e2f6ae4e-27f4-4197-b694-f80a4aee0b95" providerId="ADAL" clId="{31C47D4D-CA6D-47D6-B080-312CAD91072A}" dt="2022-05-23T09:49:21.450" v="328" actId="478"/>
+          <ac:spMkLst>
+            <pc:docMk/>
+            <pc:sldMk cId="2690026751" sldId="256"/>
+            <ac:spMk id="9" creationId="{194D3C90-27B1-4235-A376-A222A814B015}"/>
+          </ac:spMkLst>
+        </pc:spChg>
+        <pc:spChg chg="add mod">
+          <ac:chgData name="Haug, Saskia (IISM)" userId="e2f6ae4e-27f4-4197-b694-f80a4aee0b95" providerId="ADAL" clId="{31C47D4D-CA6D-47D6-B080-312CAD91072A}" dt="2022-05-23T09:50:24.622" v="439" actId="14100"/>
+          <ac:spMkLst>
+            <pc:docMk/>
+            <pc:sldMk cId="2690026751" sldId="256"/>
+            <ac:spMk id="13" creationId="{5FE3A86F-17ED-4936-9060-E4F0E69EE3DE}"/>
+          </ac:spMkLst>
+        </pc:spChg>
+        <pc:spChg chg="del mod">
+          <ac:chgData name="Haug, Saskia (IISM)" userId="e2f6ae4e-27f4-4197-b694-f80a4aee0b95" providerId="ADAL" clId="{31C47D4D-CA6D-47D6-B080-312CAD91072A}" dt="2022-05-23T09:49:38.056" v="337" actId="478"/>
+          <ac:spMkLst>
+            <pc:docMk/>
+            <pc:sldMk cId="2690026751" sldId="256"/>
+            <ac:spMk id="14" creationId="{F25259CB-FD45-485E-81E8-D851A3C8F4AE}"/>
+          </ac:spMkLst>
+        </pc:spChg>
+        <pc:spChg chg="mod">
+          <ac:chgData name="Haug, Saskia (IISM)" userId="e2f6ae4e-27f4-4197-b694-f80a4aee0b95" providerId="ADAL" clId="{31C47D4D-CA6D-47D6-B080-312CAD91072A}" dt="2022-05-23T09:54:55.858" v="440" actId="33524"/>
+          <ac:spMkLst>
+            <pc:docMk/>
+            <pc:sldMk cId="2690026751" sldId="256"/>
+            <ac:spMk id="15" creationId="{490C511B-6EA7-4EFF-AE09-C22E42749393}"/>
+          </ac:spMkLst>
+        </pc:spChg>
+        <pc:picChg chg="del">
+          <ac:chgData name="Haug, Saskia (IISM)" userId="e2f6ae4e-27f4-4197-b694-f80a4aee0b95" providerId="ADAL" clId="{31C47D4D-CA6D-47D6-B080-312CAD91072A}" dt="2022-05-23T09:46:32.959" v="2" actId="478"/>
+          <ac:picMkLst>
+            <pc:docMk/>
+            <pc:sldMk cId="2690026751" sldId="256"/>
+            <ac:picMk id="3" creationId="{30EEB861-9ACB-4131-BF5E-ADD67C013045}"/>
+          </ac:picMkLst>
+        </pc:picChg>
+        <pc:picChg chg="add mod ord">
+          <ac:chgData name="Haug, Saskia (IISM)" userId="e2f6ae4e-27f4-4197-b694-f80a4aee0b95" providerId="ADAL" clId="{31C47D4D-CA6D-47D6-B080-312CAD91072A}" dt="2022-05-23T09:47:40.748" v="147" actId="1076"/>
+          <ac:picMkLst>
+            <pc:docMk/>
+            <pc:sldMk cId="2690026751" sldId="256"/>
+            <ac:picMk id="7" creationId="{791B5F64-9022-418E-B017-46DE1AA5C500}"/>
+          </ac:picMkLst>
+        </pc:picChg>
+      </pc:sldChg>
+      <pc:sldChg chg="del">
+        <pc:chgData name="Haug, Saskia (IISM)" userId="e2f6ae4e-27f4-4197-b694-f80a4aee0b95" providerId="ADAL" clId="{31C47D4D-CA6D-47D6-B080-312CAD91072A}" dt="2022-05-23T09:55:33.305" v="441" actId="47"/>
+        <pc:sldMkLst>
+          <pc:docMk/>
+          <pc:sldMk cId="925295292" sldId="257"/>
+        </pc:sldMkLst>
+      </pc:sldChg>
+      <pc:sldChg chg="del">
+        <pc:chgData name="Haug, Saskia (IISM)" userId="e2f6ae4e-27f4-4197-b694-f80a4aee0b95" providerId="ADAL" clId="{31C47D4D-CA6D-47D6-B080-312CAD91072A}" dt="2022-05-23T09:55:37.231" v="442" actId="47"/>
+        <pc:sldMkLst>
+          <pc:docMk/>
+          <pc:sldMk cId="2450177843" sldId="258"/>
+        </pc:sldMkLst>
+      </pc:sldChg>
+      <pc:sldChg chg="add del">
+        <pc:chgData name="Haug, Saskia (IISM)" userId="e2f6ae4e-27f4-4197-b694-f80a4aee0b95" providerId="ADAL" clId="{31C47D4D-CA6D-47D6-B080-312CAD91072A}" dt="2022-05-23T09:57:54.082" v="449" actId="47"/>
+        <pc:sldMkLst>
+          <pc:docMk/>
+          <pc:sldMk cId="545339574" sldId="259"/>
+        </pc:sldMkLst>
+      </pc:sldChg>
+      <pc:sldChg chg="addSp delSp modSp add del mod">
+        <pc:chgData name="Haug, Saskia (IISM)" userId="e2f6ae4e-27f4-4197-b694-f80a4aee0b95" providerId="ADAL" clId="{31C47D4D-CA6D-47D6-B080-312CAD91072A}" dt="2022-05-23T12:07:52.072" v="847" actId="1076"/>
+        <pc:sldMkLst>
+          <pc:docMk/>
+          <pc:sldMk cId="1519722111" sldId="260"/>
+        </pc:sldMkLst>
+        <pc:spChg chg="mod">
+          <ac:chgData name="Haug, Saskia (IISM)" userId="e2f6ae4e-27f4-4197-b694-f80a4aee0b95" providerId="ADAL" clId="{31C47D4D-CA6D-47D6-B080-312CAD91072A}" dt="2022-05-23T12:03:28.791" v="772" actId="1076"/>
+          <ac:spMkLst>
+            <pc:docMk/>
+            <pc:sldMk cId="1519722111" sldId="260"/>
+            <ac:spMk id="9" creationId="{194D3C90-27B1-4235-A376-A222A814B015}"/>
+          </ac:spMkLst>
+        </pc:spChg>
+        <pc:spChg chg="mod">
+          <ac:chgData name="Haug, Saskia (IISM)" userId="e2f6ae4e-27f4-4197-b694-f80a4aee0b95" providerId="ADAL" clId="{31C47D4D-CA6D-47D6-B080-312CAD91072A}" dt="2022-05-23T12:04:21.201" v="794" actId="14100"/>
+          <ac:spMkLst>
+            <pc:docMk/>
+            <pc:sldMk cId="1519722111" sldId="260"/>
+            <ac:spMk id="10" creationId="{209E3891-E690-4A97-BE2B-3B105E2BAB67}"/>
+          </ac:spMkLst>
+        </pc:spChg>
+        <pc:spChg chg="mod">
+          <ac:chgData name="Haug, Saskia (IISM)" userId="e2f6ae4e-27f4-4197-b694-f80a4aee0b95" providerId="ADAL" clId="{31C47D4D-CA6D-47D6-B080-312CAD91072A}" dt="2022-05-23T12:07:43.183" v="846" actId="3064"/>
+          <ac:spMkLst>
+            <pc:docMk/>
+            <pc:sldMk cId="1519722111" sldId="260"/>
+            <ac:spMk id="11" creationId="{19D7EBED-DD57-4BEF-8EA1-9BE44C2D015A}"/>
+          </ac:spMkLst>
+        </pc:spChg>
+        <pc:spChg chg="mod">
+          <ac:chgData name="Haug, Saskia (IISM)" userId="e2f6ae4e-27f4-4197-b694-f80a4aee0b95" providerId="ADAL" clId="{31C47D4D-CA6D-47D6-B080-312CAD91072A}" dt="2022-05-23T12:04:12.473" v="792" actId="1076"/>
+          <ac:spMkLst>
+            <pc:docMk/>
+            <pc:sldMk cId="1519722111" sldId="260"/>
+            <ac:spMk id="12" creationId="{1997027B-FCFC-4951-B826-E1F17E1CAFEA}"/>
+          </ac:spMkLst>
+        </pc:spChg>
+        <pc:picChg chg="del">
+          <ac:chgData name="Haug, Saskia (IISM)" userId="e2f6ae4e-27f4-4197-b694-f80a4aee0b95" providerId="ADAL" clId="{31C47D4D-CA6D-47D6-B080-312CAD91072A}" dt="2022-05-23T09:58:22.812" v="453" actId="478"/>
+          <ac:picMkLst>
+            <pc:docMk/>
+            <pc:sldMk cId="1519722111" sldId="260"/>
+            <ac:picMk id="3" creationId="{FA8E0D31-EC64-4788-A36D-136CABC8B747}"/>
+          </ac:picMkLst>
+        </pc:picChg>
+        <pc:picChg chg="add del mod ord">
+          <ac:chgData name="Haug, Saskia (IISM)" userId="e2f6ae4e-27f4-4197-b694-f80a4aee0b95" providerId="ADAL" clId="{31C47D4D-CA6D-47D6-B080-312CAD91072A}" dt="2022-05-23T12:03:03.915" v="767" actId="478"/>
+          <ac:picMkLst>
+            <pc:docMk/>
+            <pc:sldMk cId="1519722111" sldId="260"/>
+            <ac:picMk id="4" creationId="{67E5BB63-B283-4B11-93A6-C9029BB89F7F}"/>
+          </ac:picMkLst>
+        </pc:picChg>
+        <pc:picChg chg="add mod ord">
+          <ac:chgData name="Haug, Saskia (IISM)" userId="e2f6ae4e-27f4-4197-b694-f80a4aee0b95" providerId="ADAL" clId="{31C47D4D-CA6D-47D6-B080-312CAD91072A}" dt="2022-05-23T12:07:52.072" v="847" actId="1076"/>
+          <ac:picMkLst>
+            <pc:docMk/>
+            <pc:sldMk cId="1519722111" sldId="260"/>
+            <ac:picMk id="8" creationId="{C1691830-3DA3-4EEA-B7D7-D9338989D757}"/>
+          </ac:picMkLst>
+        </pc:picChg>
+      </pc:sldChg>
+      <pc:sldChg chg="addSp delSp modSp del mod">
+        <pc:chgData name="Haug, Saskia (IISM)" userId="e2f6ae4e-27f4-4197-b694-f80a4aee0b95" providerId="ADAL" clId="{31C47D4D-CA6D-47D6-B080-312CAD91072A}" dt="2022-05-23T12:12:15.910" v="982" actId="47"/>
+        <pc:sldMkLst>
+          <pc:docMk/>
+          <pc:sldMk cId="2337657052" sldId="261"/>
+        </pc:sldMkLst>
+        <pc:picChg chg="add del">
+          <ac:chgData name="Haug, Saskia (IISM)" userId="e2f6ae4e-27f4-4197-b694-f80a4aee0b95" providerId="ADAL" clId="{31C47D4D-CA6D-47D6-B080-312CAD91072A}" dt="2022-05-23T12:05:54.489" v="811" actId="22"/>
+          <ac:picMkLst>
+            <pc:docMk/>
+            <pc:sldMk cId="2337657052" sldId="261"/>
+            <ac:picMk id="3" creationId="{34BC8539-9F0E-44A8-A12F-1C7469C5DE56}"/>
+          </ac:picMkLst>
+        </pc:picChg>
+        <pc:picChg chg="add del mod">
+          <ac:chgData name="Haug, Saskia (IISM)" userId="e2f6ae4e-27f4-4197-b694-f80a4aee0b95" providerId="ADAL" clId="{31C47D4D-CA6D-47D6-B080-312CAD91072A}" dt="2022-05-23T12:12:14.732" v="981" actId="478"/>
+          <ac:picMkLst>
+            <pc:docMk/>
+            <pc:sldMk cId="2337657052" sldId="261"/>
+            <ac:picMk id="4" creationId="{0896EA45-9AFF-480D-931C-9905B9D8F782}"/>
+          </ac:picMkLst>
+        </pc:picChg>
+      </pc:sldChg>
+      <pc:sldChg chg="add del">
+        <pc:chgData name="Haug, Saskia (IISM)" userId="e2f6ae4e-27f4-4197-b694-f80a4aee0b95" providerId="ADAL" clId="{31C47D4D-CA6D-47D6-B080-312CAD91072A}" dt="2022-05-23T12:12:09.486" v="980" actId="47"/>
+        <pc:sldMkLst>
+          <pc:docMk/>
+          <pc:sldMk cId="236000781" sldId="262"/>
+        </pc:sldMkLst>
+      </pc:sldChg>
+      <pc:sldChg chg="addSp delSp modSp mod">
+        <pc:chgData name="Haug, Saskia (IISM)" userId="e2f6ae4e-27f4-4197-b694-f80a4aee0b95" providerId="ADAL" clId="{31C47D4D-CA6D-47D6-B080-312CAD91072A}" dt="2022-05-23T12:12:43.741" v="986" actId="14100"/>
+        <pc:sldMkLst>
+          <pc:docMk/>
+          <pc:sldMk cId="1896473912" sldId="263"/>
+        </pc:sldMkLst>
+        <pc:spChg chg="mod">
+          <ac:chgData name="Haug, Saskia (IISM)" userId="e2f6ae4e-27f4-4197-b694-f80a4aee0b95" providerId="ADAL" clId="{31C47D4D-CA6D-47D6-B080-312CAD91072A}" dt="2022-05-23T12:10:33.702" v="858" actId="14100"/>
+          <ac:spMkLst>
+            <pc:docMk/>
+            <pc:sldMk cId="1896473912" sldId="263"/>
+            <ac:spMk id="8" creationId="{139FC0DB-798F-4DF8-9416-4AE7155367E8}"/>
+          </ac:spMkLst>
+        </pc:spChg>
+        <pc:spChg chg="add mod">
+          <ac:chgData name="Haug, Saskia (IISM)" userId="e2f6ae4e-27f4-4197-b694-f80a4aee0b95" providerId="ADAL" clId="{31C47D4D-CA6D-47D6-B080-312CAD91072A}" dt="2022-05-23T12:11:49.645" v="979" actId="20577"/>
+          <ac:spMkLst>
+            <pc:docMk/>
+            <pc:sldMk cId="1896473912" sldId="263"/>
+            <ac:spMk id="10" creationId="{6FFE663A-AEA0-4ABA-942C-81874D9BD1BC}"/>
+          </ac:spMkLst>
+        </pc:spChg>
+        <pc:spChg chg="mod">
+          <ac:chgData name="Haug, Saskia (IISM)" userId="e2f6ae4e-27f4-4197-b694-f80a4aee0b95" providerId="ADAL" clId="{31C47D4D-CA6D-47D6-B080-312CAD91072A}" dt="2022-05-23T12:11:04.348" v="880" actId="1076"/>
+          <ac:spMkLst>
+            <pc:docMk/>
+            <pc:sldMk cId="1896473912" sldId="263"/>
+            <ac:spMk id="11" creationId="{19D7EBED-DD57-4BEF-8EA1-9BE44C2D015A}"/>
+          </ac:spMkLst>
+        </pc:spChg>
+        <pc:picChg chg="add mod ord modCrop">
+          <ac:chgData name="Haug, Saskia (IISM)" userId="e2f6ae4e-27f4-4197-b694-f80a4aee0b95" providerId="ADAL" clId="{31C47D4D-CA6D-47D6-B080-312CAD91072A}" dt="2022-05-23T12:12:43.741" v="986" actId="14100"/>
+          <ac:picMkLst>
+            <pc:docMk/>
+            <pc:sldMk cId="1896473912" sldId="263"/>
+            <ac:picMk id="3" creationId="{6BB68CCA-4F88-43CA-81BA-1E8C1A9FE5B7}"/>
+          </ac:picMkLst>
+        </pc:picChg>
+        <pc:picChg chg="del">
+          <ac:chgData name="Haug, Saskia (IISM)" userId="e2f6ae4e-27f4-4197-b694-f80a4aee0b95" providerId="ADAL" clId="{31C47D4D-CA6D-47D6-B080-312CAD91072A}" dt="2022-05-23T12:10:29.698" v="857" actId="478"/>
+          <ac:picMkLst>
+            <pc:docMk/>
+            <pc:sldMk cId="1896473912" sldId="263"/>
+            <ac:picMk id="4" creationId="{0D19CF01-5316-4A7D-ACBE-DAAA602B7820}"/>
+          </ac:picMkLst>
+        </pc:picChg>
+      </pc:sldChg>
+      <pc:sldChg chg="addSp delSp modSp add mod ord">
+        <pc:chgData name="Haug, Saskia (IISM)" userId="e2f6ae4e-27f4-4197-b694-f80a4aee0b95" providerId="ADAL" clId="{31C47D4D-CA6D-47D6-B080-312CAD91072A}" dt="2022-05-23T12:10:05.805" v="853" actId="1076"/>
+        <pc:sldMkLst>
+          <pc:docMk/>
+          <pc:sldMk cId="2103828319" sldId="264"/>
+        </pc:sldMkLst>
+        <pc:spChg chg="add del mod">
+          <ac:chgData name="Haug, Saskia (IISM)" userId="e2f6ae4e-27f4-4197-b694-f80a4aee0b95" providerId="ADAL" clId="{31C47D4D-CA6D-47D6-B080-312CAD91072A}" dt="2022-05-23T12:04:40.554" v="797" actId="478"/>
+          <ac:spMkLst>
+            <pc:docMk/>
+            <pc:sldMk cId="2103828319" sldId="264"/>
+            <ac:spMk id="3" creationId="{5BEECF51-0729-4624-80C2-DD994075FDEB}"/>
+          </ac:spMkLst>
+        </pc:spChg>
+        <pc:spChg chg="del">
+          <ac:chgData name="Haug, Saskia (IISM)" userId="e2f6ae4e-27f4-4197-b694-f80a4aee0b95" providerId="ADAL" clId="{31C47D4D-CA6D-47D6-B080-312CAD91072A}" dt="2022-05-23T12:04:37.873" v="796" actId="478"/>
+          <ac:spMkLst>
+            <pc:docMk/>
+            <pc:sldMk cId="2103828319" sldId="264"/>
+            <ac:spMk id="9" creationId="{194D3C90-27B1-4235-A376-A222A814B015}"/>
+          </ac:spMkLst>
+        </pc:spChg>
+        <pc:spChg chg="del">
+          <ac:chgData name="Haug, Saskia (IISM)" userId="e2f6ae4e-27f4-4197-b694-f80a4aee0b95" providerId="ADAL" clId="{31C47D4D-CA6D-47D6-B080-312CAD91072A}" dt="2022-05-23T12:04:37.873" v="796" actId="478"/>
+          <ac:spMkLst>
+            <pc:docMk/>
+            <pc:sldMk cId="2103828319" sldId="264"/>
+            <ac:spMk id="10" creationId="{209E3891-E690-4A97-BE2B-3B105E2BAB67}"/>
+          </ac:spMkLst>
+        </pc:spChg>
+        <pc:spChg chg="del">
+          <ac:chgData name="Haug, Saskia (IISM)" userId="e2f6ae4e-27f4-4197-b694-f80a4aee0b95" providerId="ADAL" clId="{31C47D4D-CA6D-47D6-B080-312CAD91072A}" dt="2022-05-23T12:04:37.873" v="796" actId="478"/>
+          <ac:spMkLst>
+            <pc:docMk/>
+            <pc:sldMk cId="2103828319" sldId="264"/>
+            <ac:spMk id="11" creationId="{19D7EBED-DD57-4BEF-8EA1-9BE44C2D015A}"/>
+          </ac:spMkLst>
+        </pc:spChg>
+        <pc:spChg chg="del">
+          <ac:chgData name="Haug, Saskia (IISM)" userId="e2f6ae4e-27f4-4197-b694-f80a4aee0b95" providerId="ADAL" clId="{31C47D4D-CA6D-47D6-B080-312CAD91072A}" dt="2022-05-23T12:04:37.873" v="796" actId="478"/>
+          <ac:spMkLst>
+            <pc:docMk/>
+            <pc:sldMk cId="2103828319" sldId="264"/>
+            <ac:spMk id="12" creationId="{1997027B-FCFC-4951-B826-E1F17E1CAFEA}"/>
+          </ac:spMkLst>
+        </pc:spChg>
+        <pc:spChg chg="add mod">
+          <ac:chgData name="Haug, Saskia (IISM)" userId="e2f6ae4e-27f4-4197-b694-f80a4aee0b95" providerId="ADAL" clId="{31C47D4D-CA6D-47D6-B080-312CAD91072A}" dt="2022-05-23T12:10:05.805" v="853" actId="1076"/>
+          <ac:spMkLst>
+            <pc:docMk/>
+            <pc:sldMk cId="2103828319" sldId="264"/>
+            <ac:spMk id="13" creationId="{8A56B2B6-3620-43F5-8D7B-A78F1E589804}"/>
+          </ac:spMkLst>
+        </pc:spChg>
+        <pc:picChg chg="add mod ord">
+          <ac:chgData name="Haug, Saskia (IISM)" userId="e2f6ae4e-27f4-4197-b694-f80a4aee0b95" providerId="ADAL" clId="{31C47D4D-CA6D-47D6-B080-312CAD91072A}" dt="2022-05-23T12:06:06.102" v="817" actId="167"/>
+          <ac:picMkLst>
+            <pc:docMk/>
+            <pc:sldMk cId="2103828319" sldId="264"/>
+            <ac:picMk id="7" creationId="{ECB36397-13ED-448A-ACED-2A2E25BAD6F0}"/>
+          </ac:picMkLst>
+        </pc:picChg>
+        <pc:picChg chg="del">
+          <ac:chgData name="Haug, Saskia (IISM)" userId="e2f6ae4e-27f4-4197-b694-f80a4aee0b95" providerId="ADAL" clId="{31C47D4D-CA6D-47D6-B080-312CAD91072A}" dt="2022-05-23T12:06:07.397" v="818" actId="478"/>
+          <ac:picMkLst>
+            <pc:docMk/>
+            <pc:sldMk cId="2103828319" sldId="264"/>
+            <ac:picMk id="8" creationId="{C1691830-3DA3-4EEA-B7D7-D9338989D757}"/>
+          </ac:picMkLst>
+        </pc:picChg>
+      </pc:sldChg>
+    </pc:docChg>
+  </pc:docChgLst>
+</pc:chgInfo>
+</file>
+
 <file path=ppt/handoutMasters/handoutMaster1.xml><?xml version="1.0" encoding="utf-8"?>
 <p:handoutMaster xmlns:a="http://schemas.openxmlformats.org/drawingml/2006/main" xmlns:r="http://schemas.openxmlformats.org/officeDocument/2006/relationships" xmlns:p="http://schemas.openxmlformats.org/presentationml/2006/main">
   <p:cSld>
@@ -243,7 +564,7 @@
           <a:p>
             <a:fld id="{1E843078-645D-4158-A787-42F60CFF6D2A}" type="datetimeFigureOut">
               <a:rPr lang="de-DE" smtClean="0"/>
-              <a:t>22.02.2022</a:t>
+              <a:t>23.05.2022</a:t>
             </a:fld>
             <a:endParaRPr lang="de-DE"/>
           </a:p>
@@ -420,7 +741,7 @@
           <a:p>
             <a:fld id="{9E486D6B-7251-4AFE-851B-67A0DE1DAFFC}" type="datetimeFigureOut">
               <a:rPr lang="de-DE" smtClean="0"/>
-              <a:t>22.02.2022</a:t>
+              <a:t>23.05.2022</a:t>
             </a:fld>
             <a:endParaRPr lang="de-DE"/>
           </a:p>
@@ -727,7 +1048,7 @@
           <a:p>
             <a:fld id="{65010B03-D230-4701-9F37-B6F131066B93}" type="datetime1">
               <a:rPr lang="de-DE" smtClean="0"/>
-              <a:t>22.02.2022</a:t>
+              <a:t>23.05.2022</a:t>
             </a:fld>
             <a:endParaRPr lang="de-DE" dirty="0"/>
           </a:p>
@@ -1064,7 +1385,7 @@
                 <a:latin typeface="Arial" panose="020B0604020202020204"/>
                 <a:cs typeface="Arial"/>
               </a:rPr>
-              <a:t>22.02.2022</a:t>
+              <a:t>23.05.2022</a:t>
             </a:fld>
             <a:endParaRPr kumimoji="0" lang="de-DE" sz="900" b="0" i="0" u="none" strike="noStrike" kern="1200" cap="none" spc="0" normalizeH="0" baseline="0" noProof="0" dirty="0">
               <a:ln>
@@ -1349,7 +1670,7 @@
                 <a:latin typeface="Arial" panose="020B0604020202020204"/>
                 <a:cs typeface="Arial"/>
               </a:rPr>
-              <a:t>22.02.2022</a:t>
+              <a:t>23.05.2022</a:t>
             </a:fld>
             <a:endParaRPr kumimoji="0" lang="de-DE" sz="900" b="0" i="0" u="none" strike="noStrike" kern="1200" cap="none" spc="0" normalizeH="0" baseline="0" noProof="0" dirty="0">
               <a:ln>
@@ -1606,7 +1927,7 @@
                 <a:latin typeface="Arial" panose="020B0604020202020204"/>
                 <a:cs typeface="Arial"/>
               </a:rPr>
-              <a:t>22.02.2022</a:t>
+              <a:t>23.05.2022</a:t>
             </a:fld>
             <a:endParaRPr kumimoji="0" lang="de-DE" sz="900" b="0" i="0" u="none" strike="noStrike" kern="1200" cap="none" spc="0" normalizeH="0" baseline="0" noProof="0" dirty="0">
               <a:ln>
@@ -2015,7 +2336,7 @@
                 <a:latin typeface="Arial" panose="020B0604020202020204"/>
                 <a:cs typeface="Arial"/>
               </a:rPr>
-              <a:t>22.02.2022</a:t>
+              <a:t>23.05.2022</a:t>
             </a:fld>
             <a:endParaRPr kumimoji="0" lang="de-DE" sz="900" b="0" i="0" u="none" strike="noStrike" kern="1200" cap="none" spc="0" normalizeH="0" baseline="0" noProof="0" dirty="0">
               <a:ln>
@@ -2424,7 +2745,7 @@
                 <a:latin typeface="Arial" panose="020B0604020202020204"/>
                 <a:cs typeface="Arial"/>
               </a:rPr>
-              <a:t>22.02.2022</a:t>
+              <a:t>23.05.2022</a:t>
             </a:fld>
             <a:endParaRPr kumimoji="0" lang="de-DE" sz="900" b="0" i="0" u="none" strike="noStrike" kern="1200" cap="none" spc="0" normalizeH="0" baseline="0" noProof="0" dirty="0">
               <a:ln>
@@ -2743,7 +3064,7 @@
                 <a:latin typeface="Arial" panose="020B0604020202020204"/>
                 <a:cs typeface="Arial"/>
               </a:rPr>
-              <a:t>22.02.2022</a:t>
+              <a:t>23.05.2022</a:t>
             </a:fld>
             <a:endParaRPr kumimoji="0" lang="de-DE" sz="900" b="0" i="0" u="none" strike="noStrike" kern="1200" cap="none" spc="0" normalizeH="0" baseline="0" noProof="0" dirty="0">
               <a:ln>
@@ -3090,7 +3411,7 @@
                 <a:latin typeface="Arial" panose="020B0604020202020204"/>
                 <a:cs typeface="Arial"/>
               </a:rPr>
-              <a:t>22.02.2022</a:t>
+              <a:t>23.05.2022</a:t>
             </a:fld>
             <a:endParaRPr kumimoji="0" lang="de-DE" sz="900" b="0" i="0" u="none" strike="noStrike" kern="1200" cap="none" spc="0" normalizeH="0" baseline="0" noProof="0" dirty="0">
               <a:ln>
@@ -3467,7 +3788,7 @@
                 <a:latin typeface="Arial" panose="020B0604020202020204"/>
                 <a:cs typeface="Arial"/>
               </a:rPr>
-              <a:t>22.02.2022</a:t>
+              <a:t>23.05.2022</a:t>
             </a:fld>
             <a:endParaRPr kumimoji="0" lang="de-DE" sz="900" b="0" i="0" u="none" strike="noStrike" kern="1200" cap="none" spc="0" normalizeH="0" baseline="0" noProof="0" dirty="0">
               <a:ln>
@@ -3844,7 +4165,7 @@
                 <a:latin typeface="Arial" panose="020B0604020202020204"/>
                 <a:cs typeface="Arial"/>
               </a:rPr>
-              <a:t>22.02.2022</a:t>
+              <a:t>23.05.2022</a:t>
             </a:fld>
             <a:endParaRPr kumimoji="0" lang="de-DE" sz="900" b="0" i="0" u="none" strike="noStrike" kern="1200" cap="none" spc="0" normalizeH="0" baseline="0" noProof="0" dirty="0">
               <a:ln>
@@ -4253,7 +4574,7 @@
                 <a:latin typeface="Arial" panose="020B0604020202020204"/>
                 <a:cs typeface="Arial"/>
               </a:rPr>
-              <a:t>22.02.2022</a:t>
+              <a:t>23.05.2022</a:t>
             </a:fld>
             <a:endParaRPr kumimoji="0" lang="de-DE" sz="900" b="0" i="0" u="none" strike="noStrike" kern="1200" cap="none" spc="0" normalizeH="0" baseline="0" noProof="0" dirty="0">
               <a:ln>
@@ -4718,7 +5039,7 @@
                 <a:latin typeface="Arial" panose="020B0604020202020204"/>
                 <a:cs typeface="Arial"/>
               </a:rPr>
-              <a:t>22.02.2022</a:t>
+              <a:t>23.05.2022</a:t>
             </a:fld>
             <a:endParaRPr kumimoji="0" lang="de-DE" sz="900" b="0" i="0" u="none" strike="noStrike" kern="1200" cap="none" spc="0" normalizeH="0" baseline="0" noProof="0" dirty="0">
               <a:ln>
@@ -5127,7 +5448,7 @@
                 <a:latin typeface="Arial" panose="020B0604020202020204"/>
                 <a:cs typeface="Arial"/>
               </a:rPr>
-              <a:t>22.02.2022</a:t>
+              <a:t>23.05.2022</a:t>
             </a:fld>
             <a:endParaRPr kumimoji="0" lang="de-DE" sz="900" b="0" i="0" u="none" strike="noStrike" kern="1200" cap="none" spc="0" normalizeH="0" baseline="0" noProof="0" dirty="0">
               <a:ln>
@@ -5598,7 +5919,7 @@
                 <a:latin typeface="Arial" panose="020B0604020202020204"/>
                 <a:cs typeface="Arial"/>
               </a:rPr>
-              <a:t>22.02.2022</a:t>
+              <a:t>23.05.2022</a:t>
             </a:fld>
             <a:endParaRPr kumimoji="0" lang="de-DE" sz="900" b="0" i="0" u="none" strike="noStrike" kern="1200" cap="none" spc="0" normalizeH="0" baseline="0" noProof="0" dirty="0">
               <a:ln>
@@ -6069,7 +6390,7 @@
                 <a:latin typeface="Arial" panose="020B0604020202020204"/>
                 <a:cs typeface="Arial"/>
               </a:rPr>
-              <a:t>22.02.2022</a:t>
+              <a:t>23.05.2022</a:t>
             </a:fld>
             <a:endParaRPr kumimoji="0" lang="de-DE" sz="900" b="0" i="0" u="none" strike="noStrike" kern="1200" cap="none" spc="0" normalizeH="0" baseline="0" noProof="0" dirty="0">
               <a:ln>
@@ -6540,7 +6861,7 @@
                 <a:latin typeface="Arial" panose="020B0604020202020204"/>
                 <a:cs typeface="Arial"/>
               </a:rPr>
-              <a:t>22.02.2022</a:t>
+              <a:t>23.05.2022</a:t>
             </a:fld>
             <a:endParaRPr kumimoji="0" lang="de-DE" sz="900" b="0" i="0" u="none" strike="noStrike" kern="1200" cap="none" spc="0" normalizeH="0" baseline="0" noProof="0" dirty="0">
               <a:ln>
@@ -7073,7 +7394,7 @@
                 <a:latin typeface="Arial" panose="020B0604020202020204"/>
                 <a:cs typeface="Arial"/>
               </a:rPr>
-              <a:t>22.02.2022</a:t>
+              <a:t>23.05.2022</a:t>
             </a:fld>
             <a:endParaRPr kumimoji="0" lang="de-DE" sz="900" b="0" i="0" u="none" strike="noStrike" kern="1200" cap="none" spc="0" normalizeH="0" baseline="0" noProof="0" dirty="0">
               <a:ln>
@@ -7548,7 +7869,7 @@
                 <a:latin typeface="Arial" panose="020B0604020202020204"/>
                 <a:cs typeface="Arial"/>
               </a:rPr>
-              <a:t>22.02.2022</a:t>
+              <a:t>23.05.2022</a:t>
             </a:fld>
             <a:endParaRPr kumimoji="0" lang="de-DE" sz="900" b="0" i="0" u="none" strike="noStrike" kern="1200" cap="none" spc="0" normalizeH="0" baseline="0" noProof="0" dirty="0">
               <a:ln>
@@ -7863,7 +8184,7 @@
                 <a:latin typeface="Arial" panose="020B0604020202020204"/>
                 <a:cs typeface="Arial"/>
               </a:rPr>
-              <a:t>22.02.2022</a:t>
+              <a:t>23.05.2022</a:t>
             </a:fld>
             <a:endParaRPr kumimoji="0" lang="de-DE" sz="900" b="0" i="0" u="none" strike="noStrike" kern="1200" cap="none" spc="0" normalizeH="0" baseline="0" noProof="0" dirty="0">
               <a:ln>
@@ -8240,7 +8561,7 @@
                 <a:latin typeface="Arial" panose="020B0604020202020204"/>
                 <a:cs typeface="Arial"/>
               </a:rPr>
-              <a:t>22.02.2022</a:t>
+              <a:t>23.05.2022</a:t>
             </a:fld>
             <a:endParaRPr kumimoji="0" lang="de-DE" sz="900" b="0" i="0" u="none" strike="noStrike" kern="1200" cap="none" spc="0" normalizeH="0" baseline="0" noProof="0" dirty="0">
               <a:ln>
@@ -8617,7 +8938,7 @@
                 <a:latin typeface="Arial" panose="020B0604020202020204"/>
                 <a:cs typeface="Arial"/>
               </a:rPr>
-              <a:t>22.02.2022</a:t>
+              <a:t>23.05.2022</a:t>
             </a:fld>
             <a:endParaRPr kumimoji="0" lang="de-DE" sz="900" b="0" i="0" u="none" strike="noStrike" kern="1200" cap="none" spc="0" normalizeH="0" baseline="0" noProof="0" dirty="0">
               <a:ln>
@@ -8932,7 +9253,7 @@
                 <a:latin typeface="Arial" panose="020B0604020202020204"/>
                 <a:cs typeface="Arial"/>
               </a:rPr>
-              <a:t>22.02.2022</a:t>
+              <a:t>23.05.2022</a:t>
             </a:fld>
             <a:endParaRPr kumimoji="0" lang="de-DE" sz="900" b="0" i="0" u="none" strike="noStrike" kern="1200" cap="none" spc="0" normalizeH="0" baseline="0" noProof="0" dirty="0">
               <a:ln>
@@ -9247,7 +9568,7 @@
                 <a:latin typeface="Arial" panose="020B0604020202020204"/>
                 <a:cs typeface="Arial"/>
               </a:rPr>
-              <a:t>22.02.2022</a:t>
+              <a:t>23.05.2022</a:t>
             </a:fld>
             <a:endParaRPr kumimoji="0" lang="de-DE" sz="900" b="0" i="0" u="none" strike="noStrike" kern="1200" cap="none" spc="0" normalizeH="0" baseline="0" noProof="0" dirty="0">
               <a:ln>
@@ -9624,7 +9945,7 @@
                 <a:latin typeface="Arial" panose="020B0604020202020204"/>
                 <a:cs typeface="Arial"/>
               </a:rPr>
-              <a:t>22.02.2022</a:t>
+              <a:t>23.05.2022</a:t>
             </a:fld>
             <a:endParaRPr kumimoji="0" lang="de-DE" sz="900" b="0" i="0" u="none" strike="noStrike" kern="1200" cap="none" spc="0" normalizeH="0" baseline="0" noProof="0" dirty="0">
               <a:ln>
@@ -10055,7 +10376,7 @@
           <a:p>
             <a:fld id="{65010B03-D230-4701-9F37-B6F131066B93}" type="datetime1">
               <a:rPr lang="de-DE" smtClean="0"/>
-              <a:t>22.02.2022</a:t>
+              <a:t>23.05.2022</a:t>
             </a:fld>
             <a:endParaRPr lang="de-DE" dirty="0"/>
           </a:p>
@@ -10761,7 +11082,7 @@
                 <a:latin typeface="Arial" panose="020B0604020202020204"/>
                 <a:cs typeface="Arial"/>
               </a:rPr>
-              <a:t>22.02.2022</a:t>
+              <a:t>23.05.2022</a:t>
             </a:fld>
             <a:endParaRPr kumimoji="0" lang="de-DE" sz="900" b="0" i="0" u="none" strike="noStrike" kern="1200" cap="none" spc="0" normalizeH="0" baseline="0" noProof="0" dirty="0">
               <a:ln>
@@ -11630,7 +11951,7 @@
           </p:cNvGraphicFramePr>
           <p:nvPr>
             <p:custDataLst>
-              <p:tags r:id="rId4"/>
+              <p:tags r:id="rId3"/>
             </p:custDataLst>
             <p:extLst>
               <p:ext uri="{D42A27DB-BD31-4B8C-83A1-F6EECF244321}">
@@ -11647,12 +11968,12 @@
           <a:graphicData uri="http://schemas.openxmlformats.org/presentationml/2006/ole">
             <mc:AlternateContent xmlns:mc="http://schemas.openxmlformats.org/markup-compatibility/2006">
               <mc:Choice xmlns:v="urn:schemas-microsoft-com:vml" Requires="v">
-                <p:oleObj spid="_x0000_s1042" name="think-cell Folie" r:id="rId5" imgW="270" imgH="270" progId="TCLayout.ActiveDocument.1">
+                <p:oleObj name="think-cell Folie" r:id="rId4" imgW="270" imgH="270" progId="TCLayout.ActiveDocument.1">
                   <p:embed/>
                 </p:oleObj>
               </mc:Choice>
               <mc:Fallback>
-                <p:oleObj name="think-cell Folie" r:id="rId5" imgW="270" imgH="270" progId="TCLayout.ActiveDocument.1">
+                <p:oleObj name="think-cell Folie" r:id="rId4" imgW="270" imgH="270" progId="TCLayout.ActiveDocument.1">
                   <p:embed/>
                   <p:pic>
                     <p:nvPicPr>
@@ -11661,7 +11982,7 @@
                       <p:nvPr/>
                     </p:nvPicPr>
                     <p:blipFill>
-                      <a:blip r:embed="rId6"/>
+                      <a:blip r:embed="rId5"/>
                       <a:stretch>
                         <a:fillRect/>
                       </a:stretch>
@@ -12063,6 +12384,36 @@
           <a:chExt cx="0" cy="0"/>
         </a:xfrm>
       </p:grpSpPr>
+      <p:pic>
+        <p:nvPicPr>
+          <p:cNvPr id="7" name="Grafik 6">
+            <a:extLst>
+              <a:ext uri="{FF2B5EF4-FFF2-40B4-BE49-F238E27FC236}">
+                <a16:creationId xmlns:a16="http://schemas.microsoft.com/office/drawing/2014/main" id="{791B5F64-9022-418E-B017-46DE1AA5C500}"/>
+              </a:ext>
+            </a:extLst>
+          </p:cNvPr>
+          <p:cNvPicPr>
+            <a:picLocks noChangeAspect="1"/>
+          </p:cNvPicPr>
+          <p:nvPr/>
+        </p:nvPicPr>
+        <p:blipFill>
+          <a:blip r:embed="rId2"/>
+          <a:stretch>
+            <a:fillRect/>
+          </a:stretch>
+        </p:blipFill>
+        <p:spPr>
+          <a:xfrm>
+            <a:off x="0" y="79691"/>
+            <a:ext cx="12192000" cy="3934749"/>
+          </a:xfrm>
+          <a:prstGeom prst="rect">
+            <a:avLst/>
+          </a:prstGeom>
+        </p:spPr>
+      </p:pic>
       <p:sp>
         <p:nvSpPr>
           <p:cNvPr id="5" name="Datumsplatzhalter 4">
@@ -12115,7 +12466,7 @@
                 <a:latin typeface="Arial" panose="020B0604020202020204"/>
                 <a:cs typeface="Arial"/>
               </a:rPr>
-              <a:t>2/22/2022</a:t>
+              <a:t>5/23/2022</a:t>
             </a:fld>
             <a:endParaRPr kumimoji="0" lang="en-US" sz="900" b="0" i="0" u="none" strike="noStrike" kern="1200" cap="none" spc="0" normalizeH="0" baseline="0">
               <a:ln>
@@ -12220,57 +12571,27 @@
           </a:p>
         </p:txBody>
       </p:sp>
-      <p:pic>
-        <p:nvPicPr>
-          <p:cNvPr id="3" name="Grafik 2">
-            <a:extLst>
-              <a:ext uri="{FF2B5EF4-FFF2-40B4-BE49-F238E27FC236}">
-                <a16:creationId xmlns:a16="http://schemas.microsoft.com/office/drawing/2014/main" id="{30EEB861-9ACB-4131-BF5E-ADD67C013045}"/>
-              </a:ext>
-            </a:extLst>
-          </p:cNvPr>
-          <p:cNvPicPr>
-            <a:picLocks noChangeAspect="1"/>
-          </p:cNvPicPr>
+      <p:sp>
+        <p:nvSpPr>
+          <p:cNvPr id="4" name="Sprechblase: rechteckig mit abgerundeten Ecken 3">
+            <a:extLst>
+              <a:ext uri="{FF2B5EF4-FFF2-40B4-BE49-F238E27FC236}">
+                <a16:creationId xmlns:a16="http://schemas.microsoft.com/office/drawing/2014/main" id="{DE079226-490F-408D-B92C-ADDE0AD05252}"/>
+              </a:ext>
+            </a:extLst>
+          </p:cNvPr>
+          <p:cNvSpPr/>
           <p:nvPr/>
-        </p:nvPicPr>
-        <p:blipFill>
-          <a:blip r:embed="rId2"/>
-          <a:stretch>
-            <a:fillRect/>
-          </a:stretch>
-        </p:blipFill>
+        </p:nvSpPr>
         <p:spPr>
           <a:xfrm>
-            <a:off x="0" y="80628"/>
-            <a:ext cx="12192000" cy="5949950"/>
-          </a:xfrm>
-          <a:prstGeom prst="rect">
-            <a:avLst/>
-          </a:prstGeom>
-        </p:spPr>
-      </p:pic>
-      <p:sp>
-        <p:nvSpPr>
-          <p:cNvPr id="4" name="Sprechblase: rechteckig mit abgerundeten Ecken 3">
-            <a:extLst>
-              <a:ext uri="{FF2B5EF4-FFF2-40B4-BE49-F238E27FC236}">
-                <a16:creationId xmlns:a16="http://schemas.microsoft.com/office/drawing/2014/main" id="{DE079226-490F-408D-B92C-ADDE0AD05252}"/>
-              </a:ext>
-            </a:extLst>
-          </p:cNvPr>
-          <p:cNvSpPr/>
-          <p:nvPr/>
-        </p:nvSpPr>
-        <p:spPr>
-          <a:xfrm>
-            <a:off x="3359696" y="1556792"/>
-            <a:ext cx="3420380" cy="980548"/>
+            <a:off x="3286849" y="2921158"/>
+            <a:ext cx="4356485" cy="1159700"/>
           </a:xfrm>
           <a:prstGeom prst="wedgeRoundRectCallout">
             <a:avLst>
-              <a:gd name="adj1" fmla="val -31090"/>
-              <a:gd name="adj2" fmla="val -72486"/>
+              <a:gd name="adj1" fmla="val -34807"/>
+              <a:gd name="adj2" fmla="val -133265"/>
               <a:gd name="adj3" fmla="val 16667"/>
             </a:avLst>
           </a:prstGeom>
@@ -12312,23 +12633,7 @@
                   <a:schemeClr val="tx1"/>
                 </a:solidFill>
               </a:rPr>
-              <a:t>Click on the row of an </a:t>
-            </a:r>
-            <a:r>
-              <a:rPr lang="en-US" sz="1400" dirty="0" err="1">
-                <a:solidFill>
-                  <a:schemeClr val="tx1"/>
-                </a:solidFill>
-              </a:rPr>
-              <a:t>Infoprovider</a:t>
-            </a:r>
-            <a:r>
-              <a:rPr lang="en-US" sz="1400" dirty="0">
-                <a:solidFill>
-                  <a:schemeClr val="tx1"/>
-                </a:solidFill>
-              </a:rPr>
-              <a:t> to inspect the results of the forecast run in the Summary, Forecast and Statistics sections of the main navigation</a:t>
+              <a:t>Click on the row of this table to inspect the results of the forecast run in the Article Forecast section of the main navigation. In this version you can only click on the article that you are supposed to plan according to your task instructions.</a:t>
             </a:r>
           </a:p>
         </p:txBody>
@@ -12347,13 +12652,13 @@
         </p:nvSpPr>
         <p:spPr>
           <a:xfrm>
-            <a:off x="6971167" y="181068"/>
-            <a:ext cx="2484000" cy="756000"/>
+            <a:off x="6240016" y="181068"/>
+            <a:ext cx="3215151" cy="1159700"/>
           </a:xfrm>
           <a:prstGeom prst="wedgeRoundRectCallout">
             <a:avLst>
-              <a:gd name="adj1" fmla="val 62317"/>
-              <a:gd name="adj2" fmla="val 32341"/>
+              <a:gd name="adj1" fmla="val 73537"/>
+              <a:gd name="adj2" fmla="val 30894"/>
               <a:gd name="adj3" fmla="val 16667"/>
             </a:avLst>
           </a:prstGeom>
@@ -12395,23 +12700,7 @@
                   <a:schemeClr val="tx1"/>
                 </a:solidFill>
               </a:rPr>
-              <a:t>Search for a specific </a:t>
-            </a:r>
-            <a:r>
-              <a:rPr lang="en-US" sz="1400" dirty="0" err="1">
-                <a:solidFill>
-                  <a:schemeClr val="tx1"/>
-                </a:solidFill>
-              </a:rPr>
-              <a:t>Infoprovider</a:t>
-            </a:r>
-            <a:r>
-              <a:rPr lang="en-US" sz="1400" dirty="0">
-                <a:solidFill>
-                  <a:schemeClr val="tx1"/>
-                </a:solidFill>
-              </a:rPr>
-              <a:t> (if you have access to more than one)</a:t>
+              <a:t>This filters and settings usually help you to filter and search for articles in the table below. However, in this version these buttons are disabled.</a:t>
             </a:r>
           </a:p>
         </p:txBody>
@@ -12499,10 +12788,10 @@
       </p:sp>
       <p:sp>
         <p:nvSpPr>
-          <p:cNvPr id="14" name="Sprechblase: rechteckig mit abgerundeten Ecken 13">
-            <a:extLst>
-              <a:ext uri="{FF2B5EF4-FFF2-40B4-BE49-F238E27FC236}">
-                <a16:creationId xmlns:a16="http://schemas.microsoft.com/office/drawing/2014/main" id="{F25259CB-FD45-485E-81E8-D851A3C8F4AE}"/>
+          <p:cNvPr id="15" name="Sprechblase: rechteckig mit abgerundeten Ecken 14">
+            <a:extLst>
+              <a:ext uri="{FF2B5EF4-FFF2-40B4-BE49-F238E27FC236}">
+                <a16:creationId xmlns:a16="http://schemas.microsoft.com/office/drawing/2014/main" id="{490C511B-6EA7-4EFF-AE09-C22E42749393}"/>
               </a:ext>
             </a:extLst>
           </p:cNvPr>
@@ -12511,13 +12800,13 @@
         </p:nvSpPr>
         <p:spPr>
           <a:xfrm>
-            <a:off x="9624392" y="2564904"/>
-            <a:ext cx="2484000" cy="756084"/>
+            <a:off x="97082" y="2384884"/>
+            <a:ext cx="2997587" cy="1116124"/>
           </a:xfrm>
           <a:prstGeom prst="wedgeRoundRectCallout">
             <a:avLst>
-              <a:gd name="adj1" fmla="val 30820"/>
-              <a:gd name="adj2" fmla="val -308291"/>
+              <a:gd name="adj1" fmla="val -2332"/>
+              <a:gd name="adj2" fmla="val -199897"/>
               <a:gd name="adj3" fmla="val 16667"/>
             </a:avLst>
           </a:prstGeom>
@@ -12559,25 +12848,17 @@
                   <a:schemeClr val="tx1"/>
                 </a:solidFill>
               </a:rPr>
-              <a:t>Click on your username to change your password or </a:t>
-            </a:r>
-            <a:r>
-              <a:rPr lang="en-US" sz="1400" b="1" dirty="0">
-                <a:solidFill>
-                  <a:schemeClr val="tx1"/>
-                </a:solidFill>
-              </a:rPr>
-              <a:t>log out</a:t>
-            </a:r>
-          </a:p>
-        </p:txBody>
-      </p:sp>
-      <p:sp>
-        <p:nvSpPr>
-          <p:cNvPr id="9" name="Sprechblase: rechteckig mit abgerundeten Ecken 8">
-            <a:extLst>
-              <a:ext uri="{FF2B5EF4-FFF2-40B4-BE49-F238E27FC236}">
-                <a16:creationId xmlns:a16="http://schemas.microsoft.com/office/drawing/2014/main" id="{194D3C90-27B1-4235-A376-A222A814B015}"/>
+              <a:t>The main navigation is in this version of the Inspector tool disabled. Usually, you can find here more statistics about your article forecasts</a:t>
+            </a:r>
+          </a:p>
+        </p:txBody>
+      </p:sp>
+      <p:sp>
+        <p:nvSpPr>
+          <p:cNvPr id="13" name="Sprechblase: rechteckig mit abgerundeten Ecken 12">
+            <a:extLst>
+              <a:ext uri="{FF2B5EF4-FFF2-40B4-BE49-F238E27FC236}">
+                <a16:creationId xmlns:a16="http://schemas.microsoft.com/office/drawing/2014/main" id="{5FE3A86F-17ED-4936-9060-E4F0E69EE3DE}"/>
               </a:ext>
             </a:extLst>
           </p:cNvPr>
@@ -12586,13 +12867,13 @@
         </p:nvSpPr>
         <p:spPr>
           <a:xfrm>
-            <a:off x="8789404" y="1492312"/>
-            <a:ext cx="2484000" cy="972000"/>
+            <a:off x="7716181" y="2867676"/>
+            <a:ext cx="2997588" cy="813352"/>
           </a:xfrm>
           <a:prstGeom prst="wedgeRoundRectCallout">
             <a:avLst>
-              <a:gd name="adj1" fmla="val 31914"/>
-              <a:gd name="adj2" fmla="val -108038"/>
+              <a:gd name="adj1" fmla="val 35655"/>
+              <a:gd name="adj2" fmla="val -193376"/>
               <a:gd name="adj3" fmla="val 16667"/>
             </a:avLst>
           </a:prstGeom>
@@ -12634,90 +12915,7 @@
                   <a:schemeClr val="tx1"/>
                 </a:solidFill>
               </a:rPr>
-              <a:t>Select the forecast version of a specific month. By default, this shows the most recent version</a:t>
-            </a:r>
-          </a:p>
-        </p:txBody>
-      </p:sp>
-      <p:sp>
-        <p:nvSpPr>
-          <p:cNvPr id="15" name="Sprechblase: rechteckig mit abgerundeten Ecken 14">
-            <a:extLst>
-              <a:ext uri="{FF2B5EF4-FFF2-40B4-BE49-F238E27FC236}">
-                <a16:creationId xmlns:a16="http://schemas.microsoft.com/office/drawing/2014/main" id="{490C511B-6EA7-4EFF-AE09-C22E42749393}"/>
-              </a:ext>
-            </a:extLst>
-          </p:cNvPr>
-          <p:cNvSpPr/>
-          <p:nvPr/>
-        </p:nvSpPr>
-        <p:spPr>
-          <a:xfrm>
-            <a:off x="119336" y="2204864"/>
-            <a:ext cx="2997587" cy="756084"/>
-          </a:xfrm>
-          <a:prstGeom prst="wedgeRoundRectCallout">
-            <a:avLst>
-              <a:gd name="adj1" fmla="val -1492"/>
-              <a:gd name="adj2" fmla="val -263033"/>
-              <a:gd name="adj3" fmla="val 16667"/>
-            </a:avLst>
-          </a:prstGeom>
-          <a:solidFill>
-            <a:srgbClr val="FFFFCC"/>
-          </a:solidFill>
-          <a:ln>
-            <a:solidFill>
-              <a:schemeClr val="bg1">
-                <a:lumMod val="85000"/>
-              </a:schemeClr>
-            </a:solidFill>
-          </a:ln>
-        </p:spPr>
-        <p:style>
-          <a:lnRef idx="2">
-            <a:schemeClr val="accent1">
-              <a:shade val="50000"/>
-            </a:schemeClr>
-          </a:lnRef>
-          <a:fillRef idx="1">
-            <a:schemeClr val="accent1"/>
-          </a:fillRef>
-          <a:effectRef idx="0">
-            <a:schemeClr val="accent1"/>
-          </a:effectRef>
-          <a:fontRef idx="minor">
-            <a:schemeClr val="lt1"/>
-          </a:fontRef>
-        </p:style>
-        <p:txBody>
-          <a:bodyPr rtlCol="0" anchor="ctr"/>
-          <a:lstStyle/>
-          <a:p>
-            <a:pPr algn="ctr"/>
-            <a:r>
-              <a:rPr lang="en-US" sz="1400" dirty="0">
-                <a:solidFill>
-                  <a:schemeClr val="tx1"/>
-                </a:solidFill>
-              </a:rPr>
-              <a:t>The main navigation will be activated once an </a:t>
-            </a:r>
-            <a:r>
-              <a:rPr lang="en-US" sz="1400" dirty="0" err="1">
-                <a:solidFill>
-                  <a:schemeClr val="tx1"/>
-                </a:solidFill>
-              </a:rPr>
-              <a:t>Infoprovider</a:t>
-            </a:r>
-            <a:r>
-              <a:rPr lang="en-US" sz="1400" dirty="0">
-                <a:solidFill>
-                  <a:schemeClr val="tx1"/>
-                </a:solidFill>
-              </a:rPr>
-              <a:t> has been selected for inspection</a:t>
+              <a:t>By hovering over the info-icons you can see tooltips that explain the related term.</a:t>
             </a:r>
           </a:p>
         </p:txBody>
@@ -12754,10 +12952,10 @@
       </p:grpSpPr>
       <p:pic>
         <p:nvPicPr>
-          <p:cNvPr id="7" name="Grafik 6">
-            <a:extLst>
-              <a:ext uri="{FF2B5EF4-FFF2-40B4-BE49-F238E27FC236}">
-                <a16:creationId xmlns:a16="http://schemas.microsoft.com/office/drawing/2014/main" id="{AD2BCC74-58C0-409E-9E56-6E912B4B6689}"/>
+          <p:cNvPr id="8" name="Grafik 7">
+            <a:extLst>
+              <a:ext uri="{FF2B5EF4-FFF2-40B4-BE49-F238E27FC236}">
+                <a16:creationId xmlns:a16="http://schemas.microsoft.com/office/drawing/2014/main" id="{C1691830-3DA3-4EEA-B7D7-D9338989D757}"/>
               </a:ext>
             </a:extLst>
           </p:cNvPr>
@@ -12774,8 +12972,8 @@
         </p:blipFill>
         <p:spPr>
           <a:xfrm>
-            <a:off x="0" y="80628"/>
-            <a:ext cx="12192000" cy="5949950"/>
+            <a:off x="-5961" y="84736"/>
+            <a:ext cx="12192000" cy="6019800"/>
           </a:xfrm>
           <a:prstGeom prst="rect">
             <a:avLst/>
@@ -12834,7 +13032,7 @@
                 <a:latin typeface="Arial" panose="020B0604020202020204"/>
                 <a:cs typeface="Arial"/>
               </a:rPr>
-              <a:t>2/22/2022</a:t>
+              <a:t>5/23/2022</a:t>
             </a:fld>
             <a:endParaRPr kumimoji="0" lang="en-US" sz="900" b="0" i="0" u="none" strike="noStrike" kern="1200" cap="none" spc="0" normalizeH="0" baseline="0">
               <a:ln>
@@ -12941,10 +13139,93 @@
       </p:sp>
       <p:sp>
         <p:nvSpPr>
-          <p:cNvPr id="4" name="Sprechblase: rechteckig mit abgerundeten Ecken 3">
-            <a:extLst>
-              <a:ext uri="{FF2B5EF4-FFF2-40B4-BE49-F238E27FC236}">
-                <a16:creationId xmlns:a16="http://schemas.microsoft.com/office/drawing/2014/main" id="{DE079226-490F-408D-B92C-ADDE0AD05252}"/>
+          <p:cNvPr id="11" name="Textplatzhalter 10">
+            <a:extLst>
+              <a:ext uri="{FF2B5EF4-FFF2-40B4-BE49-F238E27FC236}">
+                <a16:creationId xmlns:a16="http://schemas.microsoft.com/office/drawing/2014/main" id="{19D7EBED-DD57-4BEF-8EA1-9BE44C2D015A}"/>
+              </a:ext>
+            </a:extLst>
+          </p:cNvPr>
+          <p:cNvSpPr>
+            <a:spLocks noGrp="1"/>
+          </p:cNvSpPr>
+          <p:nvPr>
+            <p:ph type="body" idx="1"/>
+          </p:nvPr>
+        </p:nvSpPr>
+        <p:spPr>
+          <a:xfrm>
+            <a:off x="-5961" y="4613807"/>
+            <a:ext cx="12192000" cy="1482193"/>
+          </a:xfrm>
+          <a:solidFill>
+            <a:srgbClr val="FFFFFF">
+              <a:alpha val="80000"/>
+            </a:srgbClr>
+          </a:solidFill>
+        </p:spPr>
+        <p:txBody>
+          <a:bodyPr lIns="72000" tIns="72000" rIns="72000" bIns="72000"/>
+          <a:lstStyle/>
+          <a:p>
+            <a:pPr marL="0" indent="0">
+              <a:lnSpc>
+                <a:spcPct val="100000"/>
+              </a:lnSpc>
+              <a:spcBef>
+                <a:spcPts val="600"/>
+              </a:spcBef>
+              <a:buNone/>
+            </a:pPr>
+            <a:r>
+              <a:rPr lang="en-US" b="1" dirty="0"/>
+              <a:t>Article Forecast</a:t>
+            </a:r>
+          </a:p>
+          <a:p>
+            <a:pPr>
+              <a:lnSpc>
+                <a:spcPct val="100000"/>
+              </a:lnSpc>
+              <a:spcBef>
+                <a:spcPts val="600"/>
+              </a:spcBef>
+            </a:pPr>
+            <a:r>
+              <a:rPr lang="en-US" dirty="0"/>
+              <a:t>In the Article Forecast section the results of the forecast run are displayed for the selected article. Additional subsections with further information can be selected below the plot</a:t>
+            </a:r>
+          </a:p>
+          <a:p>
+            <a:pPr>
+              <a:lnSpc>
+                <a:spcPct val="100000"/>
+              </a:lnSpc>
+              <a:spcBef>
+                <a:spcPts val="600"/>
+              </a:spcBef>
+            </a:pPr>
+            <a:r>
+              <a:rPr lang="en-US" dirty="0"/>
+              <a:t>The </a:t>
+            </a:r>
+            <a:r>
+              <a:rPr lang="en-US" b="1" dirty="0"/>
+              <a:t>Forecast Values </a:t>
+            </a:r>
+            <a:r>
+              <a:rPr lang="en-US" dirty="0"/>
+              <a:t>subsection shows a table of the historical data and forecast of the selected article</a:t>
+            </a:r>
+          </a:p>
+        </p:txBody>
+      </p:sp>
+      <p:sp>
+        <p:nvSpPr>
+          <p:cNvPr id="9" name="Sprechblase: rechteckig mit abgerundeten Ecken 8">
+            <a:extLst>
+              <a:ext uri="{FF2B5EF4-FFF2-40B4-BE49-F238E27FC236}">
+                <a16:creationId xmlns:a16="http://schemas.microsoft.com/office/drawing/2014/main" id="{194D3C90-27B1-4235-A376-A222A814B015}"/>
               </a:ext>
             </a:extLst>
           </p:cNvPr>
@@ -12953,13 +13234,13 @@
         </p:nvSpPr>
         <p:spPr>
           <a:xfrm>
-            <a:off x="2639616" y="584684"/>
-            <a:ext cx="2736304" cy="756000"/>
+            <a:off x="8076220" y="3481343"/>
+            <a:ext cx="2772308" cy="549501"/>
           </a:xfrm>
           <a:prstGeom prst="wedgeRoundRectCallout">
             <a:avLst>
-              <a:gd name="adj1" fmla="val -40994"/>
-              <a:gd name="adj2" fmla="val 98836"/>
+              <a:gd name="adj1" fmla="val -73633"/>
+              <a:gd name="adj2" fmla="val -35969"/>
               <a:gd name="adj3" fmla="val 16667"/>
             </a:avLst>
           </a:prstGeom>
@@ -12996,22 +13277,139 @@
           <a:p>
             <a:pPr algn="ctr"/>
             <a:r>
-              <a:rPr lang="en-US" sz="1400" dirty="0">
+              <a:rPr lang="de-DE" sz="1400" dirty="0">
                 <a:solidFill>
                   <a:schemeClr val="tx1"/>
                 </a:solidFill>
               </a:rPr>
-              <a:t>Click on the row of the article or article customer combination you want to see the details of</a:t>
-            </a:r>
-          </a:p>
-        </p:txBody>
-      </p:sp>
-      <p:sp>
-        <p:nvSpPr>
-          <p:cNvPr id="8" name="Sprechblase: rechteckig mit abgerundeten Ecken 7">
-            <a:extLst>
-              <a:ext uri="{FF2B5EF4-FFF2-40B4-BE49-F238E27FC236}">
-                <a16:creationId xmlns:a16="http://schemas.microsoft.com/office/drawing/2014/main" id="{1D5222AE-B652-4EBB-9520-69A61FA652FA}"/>
+              <a:t>Click </a:t>
+            </a:r>
+            <a:r>
+              <a:rPr lang="de-DE" sz="1400" dirty="0" err="1">
+                <a:solidFill>
+                  <a:schemeClr val="tx1"/>
+                </a:solidFill>
+              </a:rPr>
+              <a:t>here</a:t>
+            </a:r>
+            <a:r>
+              <a:rPr lang="de-DE" sz="1400" dirty="0">
+                <a:solidFill>
+                  <a:schemeClr val="tx1"/>
+                </a:solidFill>
+              </a:rPr>
+              <a:t> to </a:t>
+            </a:r>
+            <a:r>
+              <a:rPr lang="de-DE" sz="1400" dirty="0" err="1">
+                <a:solidFill>
+                  <a:schemeClr val="tx1"/>
+                </a:solidFill>
+              </a:rPr>
+              <a:t>disable</a:t>
+            </a:r>
+            <a:r>
+              <a:rPr lang="de-DE" sz="1400" dirty="0">
+                <a:solidFill>
+                  <a:schemeClr val="tx1"/>
+                </a:solidFill>
+              </a:rPr>
+              <a:t> and </a:t>
+            </a:r>
+            <a:r>
+              <a:rPr lang="de-DE" sz="1400" dirty="0" err="1">
+                <a:solidFill>
+                  <a:schemeClr val="tx1"/>
+                </a:solidFill>
+              </a:rPr>
+              <a:t>enable</a:t>
+            </a:r>
+            <a:r>
+              <a:rPr lang="de-DE" sz="1400" dirty="0">
+                <a:solidFill>
+                  <a:schemeClr val="tx1"/>
+                </a:solidFill>
+              </a:rPr>
+              <a:t> </a:t>
+            </a:r>
+            <a:r>
+              <a:rPr lang="de-DE" sz="1400" dirty="0" err="1">
+                <a:solidFill>
+                  <a:schemeClr val="tx1"/>
+                </a:solidFill>
+              </a:rPr>
+              <a:t>the</a:t>
+            </a:r>
+            <a:r>
+              <a:rPr lang="de-DE" sz="1400" dirty="0">
+                <a:solidFill>
+                  <a:schemeClr val="tx1"/>
+                </a:solidFill>
+              </a:rPr>
+              <a:t> </a:t>
+            </a:r>
+            <a:r>
+              <a:rPr lang="de-DE" sz="1400" dirty="0" err="1">
+                <a:solidFill>
+                  <a:schemeClr val="tx1"/>
+                </a:solidFill>
+              </a:rPr>
+              <a:t>plot</a:t>
+            </a:r>
+            <a:r>
+              <a:rPr lang="de-DE" sz="1400" dirty="0">
+                <a:solidFill>
+                  <a:schemeClr val="tx1"/>
+                </a:solidFill>
+              </a:rPr>
+              <a:t> </a:t>
+            </a:r>
+            <a:r>
+              <a:rPr lang="de-DE" sz="1400" dirty="0" err="1">
+                <a:solidFill>
+                  <a:schemeClr val="tx1"/>
+                </a:solidFill>
+              </a:rPr>
+              <a:t>lines</a:t>
+            </a:r>
+            <a:r>
+              <a:rPr lang="de-DE" sz="1400" dirty="0">
+                <a:solidFill>
+                  <a:schemeClr val="tx1"/>
+                </a:solidFill>
+              </a:rPr>
+              <a:t> in </a:t>
+            </a:r>
+            <a:r>
+              <a:rPr lang="de-DE" sz="1400" dirty="0" err="1">
+                <a:solidFill>
+                  <a:schemeClr val="tx1"/>
+                </a:solidFill>
+              </a:rPr>
+              <a:t>the</a:t>
+            </a:r>
+            <a:r>
+              <a:rPr lang="de-DE" sz="1400" dirty="0">
+                <a:solidFill>
+                  <a:schemeClr val="tx1"/>
+                </a:solidFill>
+              </a:rPr>
+              <a:t> graph.</a:t>
+            </a:r>
+            <a:endParaRPr lang="en-US" sz="1400" dirty="0">
+              <a:solidFill>
+                <a:schemeClr val="tx1"/>
+              </a:solidFill>
+            </a:endParaRPr>
+          </a:p>
+        </p:txBody>
+      </p:sp>
+      <p:sp>
+        <p:nvSpPr>
+          <p:cNvPr id="10" name="Sprechblase: rechteckig mit abgerundeten Ecken 9">
+            <a:extLst>
+              <a:ext uri="{FF2B5EF4-FFF2-40B4-BE49-F238E27FC236}">
+                <a16:creationId xmlns:a16="http://schemas.microsoft.com/office/drawing/2014/main" id="{209E3891-E690-4A97-BE2B-3B105E2BAB67}"/>
               </a:ext>
             </a:extLst>
           </p:cNvPr>
@@ -13020,13 +13418,13 @@
         </p:nvSpPr>
         <p:spPr>
           <a:xfrm>
-            <a:off x="6708068" y="260648"/>
-            <a:ext cx="2484000" cy="504056"/>
+            <a:off x="5961" y="2420888"/>
+            <a:ext cx="3240360" cy="1152128"/>
           </a:xfrm>
           <a:prstGeom prst="wedgeRoundRectCallout">
             <a:avLst>
-              <a:gd name="adj1" fmla="val 60859"/>
-              <a:gd name="adj2" fmla="val 59285"/>
+              <a:gd name="adj1" fmla="val 60795"/>
+              <a:gd name="adj2" fmla="val -82374"/>
               <a:gd name="adj3" fmla="val 16667"/>
             </a:avLst>
           </a:prstGeom>
@@ -13068,105 +13466,48 @@
                   <a:schemeClr val="tx1"/>
                 </a:solidFill>
               </a:rPr>
-              <a:t>Switch between article and article customer level</a:t>
-            </a:r>
-          </a:p>
-        </p:txBody>
-      </p:sp>
-      <p:sp>
-        <p:nvSpPr>
-          <p:cNvPr id="11" name="Textplatzhalter 10">
-            <a:extLst>
-              <a:ext uri="{FF2B5EF4-FFF2-40B4-BE49-F238E27FC236}">
-                <a16:creationId xmlns:a16="http://schemas.microsoft.com/office/drawing/2014/main" id="{19D7EBED-DD57-4BEF-8EA1-9BE44C2D015A}"/>
-              </a:ext>
-            </a:extLst>
-          </p:cNvPr>
-          <p:cNvSpPr>
-            <a:spLocks noGrp="1"/>
-          </p:cNvSpPr>
-          <p:nvPr>
-            <p:ph type="body" idx="1"/>
-          </p:nvPr>
+              <a:t>Mark a time frame with your mouse to zoom in on this specific time frame. To reset the zoom click on the “Reset zoom” </a:t>
+            </a:r>
+            <a:r>
+              <a:rPr lang="en-US" sz="1400" dirty="0" err="1">
+                <a:solidFill>
+                  <a:schemeClr val="tx1"/>
+                </a:solidFill>
+              </a:rPr>
+              <a:t>botton</a:t>
+            </a:r>
+            <a:r>
+              <a:rPr lang="en-US" sz="1400" dirty="0">
+                <a:solidFill>
+                  <a:schemeClr val="tx1"/>
+                </a:solidFill>
+              </a:rPr>
+              <a:t> in the upper right corner of the graph.</a:t>
+            </a:r>
+          </a:p>
+        </p:txBody>
+      </p:sp>
+      <p:sp>
+        <p:nvSpPr>
+          <p:cNvPr id="12" name="Sprechblase: rechteckig mit abgerundeten Ecken 11">
+            <a:extLst>
+              <a:ext uri="{FF2B5EF4-FFF2-40B4-BE49-F238E27FC236}">
+                <a16:creationId xmlns:a16="http://schemas.microsoft.com/office/drawing/2014/main" id="{1997027B-FCFC-4951-B826-E1F17E1CAFEA}"/>
+              </a:ext>
+            </a:extLst>
+          </p:cNvPr>
+          <p:cNvSpPr/>
+          <p:nvPr/>
         </p:nvSpPr>
         <p:spPr>
           <a:xfrm>
-            <a:off x="228600" y="4616451"/>
-            <a:ext cx="11734800" cy="1479550"/>
-          </a:xfrm>
-          <a:solidFill>
-            <a:srgbClr val="FFFFFF">
-              <a:alpha val="80000"/>
-            </a:srgbClr>
-          </a:solidFill>
-        </p:spPr>
-        <p:txBody>
-          <a:bodyPr/>
-          <a:lstStyle/>
-          <a:p>
-            <a:pPr marL="0" indent="0">
-              <a:lnSpc>
-                <a:spcPct val="100000"/>
-              </a:lnSpc>
-              <a:spcBef>
-                <a:spcPts val="600"/>
-              </a:spcBef>
-              <a:buNone/>
-            </a:pPr>
-            <a:r>
-              <a:rPr lang="en-US" b="1" dirty="0" err="1"/>
-              <a:t>Infoprovider</a:t>
-            </a:r>
-            <a:r>
-              <a:rPr lang="en-US" b="1" dirty="0"/>
-              <a:t> Summary</a:t>
-            </a:r>
-          </a:p>
-          <a:p>
-            <a:pPr>
-              <a:lnSpc>
-                <a:spcPct val="100000"/>
-              </a:lnSpc>
-              <a:spcBef>
-                <a:spcPts val="600"/>
-              </a:spcBef>
-            </a:pPr>
-            <a:r>
-              <a:rPr lang="en-US" dirty="0"/>
-              <a:t>In the Summary section all articles of an </a:t>
-            </a:r>
-            <a:r>
-              <a:rPr lang="en-US" dirty="0" err="1"/>
-              <a:t>Infoprovider</a:t>
-            </a:r>
-            <a:r>
-              <a:rPr lang="en-US" dirty="0"/>
-              <a:t> are displayed together with their individual attributes</a:t>
-            </a:r>
-          </a:p>
-        </p:txBody>
-      </p:sp>
-      <p:sp>
-        <p:nvSpPr>
-          <p:cNvPr id="9" name="Sprechblase: rechteckig mit abgerundeten Ecken 8">
-            <a:extLst>
-              <a:ext uri="{FF2B5EF4-FFF2-40B4-BE49-F238E27FC236}">
-                <a16:creationId xmlns:a16="http://schemas.microsoft.com/office/drawing/2014/main" id="{194D3C90-27B1-4235-A376-A222A814B015}"/>
-              </a:ext>
-            </a:extLst>
-          </p:cNvPr>
-          <p:cNvSpPr/>
-          <p:nvPr/>
-        </p:nvSpPr>
-        <p:spPr>
-          <a:xfrm>
-            <a:off x="9516380" y="1772816"/>
-            <a:ext cx="2556008" cy="972000"/>
+            <a:off x="6312024" y="2319671"/>
+            <a:ext cx="2340260" cy="549501"/>
           </a:xfrm>
           <a:prstGeom prst="wedgeRoundRectCallout">
             <a:avLst>
-              <a:gd name="adj1" fmla="val 27176"/>
-              <a:gd name="adj2" fmla="val -135981"/>
+              <a:gd name="adj1" fmla="val -47389"/>
+              <a:gd name="adj2" fmla="val -104901"/>
               <a:gd name="adj3" fmla="val 16667"/>
             </a:avLst>
           </a:prstGeom>
@@ -13208,22 +13549,7 @@
                   <a:schemeClr val="tx1"/>
                 </a:solidFill>
               </a:rPr>
-              <a:t>Filter the table of articles </a:t>
-            </a:r>
-            <a:br>
-              <a:rPr lang="en-US" sz="1400" dirty="0">
-                <a:solidFill>
-                  <a:schemeClr val="tx1"/>
-                </a:solidFill>
-              </a:rPr>
-            </a:br>
-            <a:r>
-              <a:rPr lang="en-US" sz="1400" dirty="0">
-                <a:solidFill>
-                  <a:schemeClr val="tx1"/>
-                </a:solidFill>
-              </a:rPr>
-              <a:t>e. g. by article number / text, customer, SBU, seasonality, ABC or warning type</a:t>
+              <a:t>Hover over the graph to see the exact numbers.</a:t>
             </a:r>
           </a:p>
         </p:txBody>
@@ -13231,7 +13557,7 @@
     </p:spTree>
     <p:extLst>
       <p:ext uri="{BB962C8B-B14F-4D97-AF65-F5344CB8AC3E}">
-        <p14:creationId xmlns:p14="http://schemas.microsoft.com/office/powerpoint/2010/main" val="925295292"/>
+        <p14:creationId xmlns:p14="http://schemas.microsoft.com/office/powerpoint/2010/main" val="1519722111"/>
       </p:ext>
     </p:extLst>
   </p:cSld>
@@ -13260,10 +13586,10 @@
       </p:grpSpPr>
       <p:pic>
         <p:nvPicPr>
-          <p:cNvPr id="3" name="Grafik 2">
-            <a:extLst>
-              <a:ext uri="{FF2B5EF4-FFF2-40B4-BE49-F238E27FC236}">
-                <a16:creationId xmlns:a16="http://schemas.microsoft.com/office/drawing/2014/main" id="{CAB857F1-3B5A-4C56-B5E7-AF5ED696D77A}"/>
+          <p:cNvPr id="7" name="Grafik 6">
+            <a:extLst>
+              <a:ext uri="{FF2B5EF4-FFF2-40B4-BE49-F238E27FC236}">
+                <a16:creationId xmlns:a16="http://schemas.microsoft.com/office/drawing/2014/main" id="{ECB36397-13ED-448A-ACED-2A2E25BAD6F0}"/>
               </a:ext>
             </a:extLst>
           </p:cNvPr>
@@ -13280,8 +13606,8 @@
         </p:blipFill>
         <p:spPr>
           <a:xfrm>
-            <a:off x="0" y="80628"/>
-            <a:ext cx="12192000" cy="5949950"/>
+            <a:off x="0" y="111317"/>
+            <a:ext cx="12192000" cy="6070574"/>
           </a:xfrm>
           <a:prstGeom prst="rect">
             <a:avLst/>
@@ -13340,7 +13666,7 @@
                 <a:latin typeface="Arial" panose="020B0604020202020204"/>
                 <a:cs typeface="Arial"/>
               </a:rPr>
-              <a:t>2/22/2022</a:t>
+              <a:t>5/23/2022</a:t>
             </a:fld>
             <a:endParaRPr kumimoji="0" lang="en-US" sz="900" b="0" i="0" u="none" strike="noStrike" kern="1200" cap="none" spc="0" normalizeH="0" baseline="0">
               <a:ln>
@@ -13447,10 +13773,10 @@
       </p:sp>
       <p:sp>
         <p:nvSpPr>
-          <p:cNvPr id="11" name="Textplatzhalter 10">
-            <a:extLst>
-              <a:ext uri="{FF2B5EF4-FFF2-40B4-BE49-F238E27FC236}">
-                <a16:creationId xmlns:a16="http://schemas.microsoft.com/office/drawing/2014/main" id="{19D7EBED-DD57-4BEF-8EA1-9BE44C2D015A}"/>
+          <p:cNvPr id="13" name="Textplatzhalter 10">
+            <a:extLst>
+              <a:ext uri="{FF2B5EF4-FFF2-40B4-BE49-F238E27FC236}">
+                <a16:creationId xmlns:a16="http://schemas.microsoft.com/office/drawing/2014/main" id="{8A56B2B6-3620-43F5-8D7B-A78F1E589804}"/>
               </a:ext>
             </a:extLst>
           </p:cNvPr>
@@ -13463,8 +13789,8 @@
         </p:nvSpPr>
         <p:spPr>
           <a:xfrm>
-            <a:off x="228600" y="4613807"/>
-            <a:ext cx="11734800" cy="1482193"/>
+            <a:off x="5961" y="2636912"/>
+            <a:ext cx="12180078" cy="1224347"/>
           </a:xfrm>
           <a:solidFill>
             <a:srgbClr val="FFFFFF">
@@ -13473,7 +13799,7 @@
           </a:solidFill>
         </p:spPr>
         <p:txBody>
-          <a:bodyPr/>
+          <a:bodyPr lIns="72000" tIns="72000" rIns="72000" bIns="72000"/>
           <a:lstStyle/>
           <a:p>
             <a:pPr marL="0" indent="0">
@@ -13487,7 +13813,7 @@
             </a:pPr>
             <a:r>
               <a:rPr lang="en-US" b="1" dirty="0"/>
-              <a:t>Data and Forecast Plot</a:t>
+              <a:t>Information</a:t>
             </a:r>
           </a:p>
           <a:p>
@@ -13501,260 +13827,15 @@
             </a:pPr>
             <a:r>
               <a:rPr lang="en-US" dirty="0"/>
-              <a:t>The Forecast section displays an interactive plot as well as a table of the historical data and forecast of the selected </a:t>
-            </a:r>
-            <a:r>
-              <a:rPr lang="en-US" dirty="0" err="1"/>
-              <a:t>Infoprovider</a:t>
+              <a:t>The </a:t>
+            </a:r>
+            <a:r>
+              <a:rPr lang="en-US" b="1" dirty="0"/>
+              <a:t>Information</a:t>
             </a:r>
             <a:r>
               <a:rPr lang="en-US" dirty="0"/>
-              <a:t> aggregated over all articles</a:t>
-            </a:r>
-          </a:p>
-          <a:p>
-            <a:pPr>
-              <a:lnSpc>
-                <a:spcPct val="100000"/>
-              </a:lnSpc>
-              <a:spcBef>
-                <a:spcPts val="600"/>
-              </a:spcBef>
-            </a:pPr>
-            <a:r>
-              <a:rPr lang="en-US" dirty="0"/>
-              <a:t>Use the filter to plot any subset of articles</a:t>
-            </a:r>
-          </a:p>
-        </p:txBody>
-      </p:sp>
-      <p:sp>
-        <p:nvSpPr>
-          <p:cNvPr id="9" name="Sprechblase: rechteckig mit abgerundeten Ecken 8">
-            <a:extLst>
-              <a:ext uri="{FF2B5EF4-FFF2-40B4-BE49-F238E27FC236}">
-                <a16:creationId xmlns:a16="http://schemas.microsoft.com/office/drawing/2014/main" id="{194D3C90-27B1-4235-A376-A222A814B015}"/>
-              </a:ext>
-            </a:extLst>
-          </p:cNvPr>
-          <p:cNvSpPr/>
-          <p:nvPr/>
-        </p:nvSpPr>
-        <p:spPr>
-          <a:xfrm>
-            <a:off x="9156340" y="1772816"/>
-            <a:ext cx="2916048" cy="1152128"/>
-          </a:xfrm>
-          <a:prstGeom prst="wedgeRoundRectCallout">
-            <a:avLst>
-              <a:gd name="adj1" fmla="val 25934"/>
-              <a:gd name="adj2" fmla="val -122622"/>
-              <a:gd name="adj3" fmla="val 16667"/>
-            </a:avLst>
-          </a:prstGeom>
-          <a:solidFill>
-            <a:srgbClr val="FFFFCC"/>
-          </a:solidFill>
-          <a:ln>
-            <a:solidFill>
-              <a:schemeClr val="bg1">
-                <a:lumMod val="85000"/>
-              </a:schemeClr>
-            </a:solidFill>
-          </a:ln>
-        </p:spPr>
-        <p:style>
-          <a:lnRef idx="2">
-            <a:schemeClr val="accent1">
-              <a:shade val="50000"/>
-            </a:schemeClr>
-          </a:lnRef>
-          <a:fillRef idx="1">
-            <a:schemeClr val="accent1"/>
-          </a:fillRef>
-          <a:effectRef idx="0">
-            <a:schemeClr val="accent1"/>
-          </a:effectRef>
-          <a:fontRef idx="minor">
-            <a:schemeClr val="lt1"/>
-          </a:fontRef>
-        </p:style>
-        <p:txBody>
-          <a:bodyPr rtlCol="0" anchor="ctr"/>
-          <a:lstStyle/>
-          <a:p>
-            <a:pPr algn="ctr"/>
-            <a:r>
-              <a:rPr lang="en-US" sz="1400" dirty="0">
-                <a:solidFill>
-                  <a:schemeClr val="tx1"/>
-                </a:solidFill>
-              </a:rPr>
-              <a:t>Filter the articles which are shown aggregated in the plot</a:t>
-            </a:r>
-            <a:br>
-              <a:rPr lang="en-US" sz="1400" dirty="0">
-                <a:solidFill>
-                  <a:schemeClr val="tx1"/>
-                </a:solidFill>
-              </a:rPr>
-            </a:br>
-            <a:r>
-              <a:rPr lang="en-US" sz="1400" dirty="0">
-                <a:solidFill>
-                  <a:schemeClr val="tx1"/>
-                </a:solidFill>
-              </a:rPr>
-              <a:t>e. g. by article number / text, customer, SBU, seasonality, ABC or warning type</a:t>
-            </a:r>
-          </a:p>
-        </p:txBody>
-      </p:sp>
-      <p:sp>
-        <p:nvSpPr>
-          <p:cNvPr id="12" name="Sprechblase: rechteckig mit abgerundeten Ecken 11">
-            <a:extLst>
-              <a:ext uri="{FF2B5EF4-FFF2-40B4-BE49-F238E27FC236}">
-                <a16:creationId xmlns:a16="http://schemas.microsoft.com/office/drawing/2014/main" id="{60EE2EA5-4D14-4348-95AA-C93777ADE460}"/>
-              </a:ext>
-            </a:extLst>
-          </p:cNvPr>
-          <p:cNvSpPr/>
-          <p:nvPr/>
-        </p:nvSpPr>
-        <p:spPr>
-          <a:xfrm>
-            <a:off x="983432" y="3429000"/>
-            <a:ext cx="2340260" cy="504056"/>
-          </a:xfrm>
-          <a:prstGeom prst="wedgeRoundRectCallout">
-            <a:avLst>
-              <a:gd name="adj1" fmla="val -53475"/>
-              <a:gd name="adj2" fmla="val 130968"/>
-              <a:gd name="adj3" fmla="val 16667"/>
-            </a:avLst>
-          </a:prstGeom>
-          <a:solidFill>
-            <a:srgbClr val="FFFFCC"/>
-          </a:solidFill>
-          <a:ln>
-            <a:solidFill>
-              <a:schemeClr val="bg1">
-                <a:lumMod val="85000"/>
-              </a:schemeClr>
-            </a:solidFill>
-          </a:ln>
-        </p:spPr>
-        <p:style>
-          <a:lnRef idx="2">
-            <a:schemeClr val="accent1">
-              <a:shade val="50000"/>
-            </a:schemeClr>
-          </a:lnRef>
-          <a:fillRef idx="1">
-            <a:schemeClr val="accent1"/>
-          </a:fillRef>
-          <a:effectRef idx="0">
-            <a:schemeClr val="accent1"/>
-          </a:effectRef>
-          <a:fontRef idx="minor">
-            <a:schemeClr val="lt1"/>
-          </a:fontRef>
-        </p:style>
-        <p:txBody>
-          <a:bodyPr rtlCol="0" anchor="ctr"/>
-          <a:lstStyle/>
-          <a:p>
-            <a:pPr algn="ctr"/>
-            <a:r>
-              <a:rPr lang="en-US" sz="1400" dirty="0">
-                <a:solidFill>
-                  <a:schemeClr val="tx1"/>
-                </a:solidFill>
-              </a:rPr>
-              <a:t>Use the sliders to zoom in on a specific time frame</a:t>
-            </a:r>
-          </a:p>
-        </p:txBody>
-      </p:sp>
-      <p:sp>
-        <p:nvSpPr>
-          <p:cNvPr id="13" name="Sprechblase: rechteckig mit abgerundeten Ecken 12">
-            <a:extLst>
-              <a:ext uri="{FF2B5EF4-FFF2-40B4-BE49-F238E27FC236}">
-                <a16:creationId xmlns:a16="http://schemas.microsoft.com/office/drawing/2014/main" id="{0145FA36-27DE-45D3-A92A-798DD5DF41B3}"/>
-              </a:ext>
-            </a:extLst>
-          </p:cNvPr>
-          <p:cNvSpPr/>
-          <p:nvPr/>
-        </p:nvSpPr>
-        <p:spPr>
-          <a:xfrm>
-            <a:off x="6744072" y="3248980"/>
-            <a:ext cx="2340260" cy="756084"/>
-          </a:xfrm>
-          <a:prstGeom prst="wedgeRoundRectCallout">
-            <a:avLst>
-              <a:gd name="adj1" fmla="val 34341"/>
-              <a:gd name="adj2" fmla="val 107020"/>
-              <a:gd name="adj3" fmla="val 16667"/>
-            </a:avLst>
-          </a:prstGeom>
-          <a:solidFill>
-            <a:srgbClr val="FFFFCC"/>
-          </a:solidFill>
-          <a:ln>
-            <a:solidFill>
-              <a:schemeClr val="bg1">
-                <a:lumMod val="85000"/>
-              </a:schemeClr>
-            </a:solidFill>
-          </a:ln>
-        </p:spPr>
-        <p:style>
-          <a:lnRef idx="2">
-            <a:schemeClr val="accent1">
-              <a:shade val="50000"/>
-            </a:schemeClr>
-          </a:lnRef>
-          <a:fillRef idx="1">
-            <a:schemeClr val="accent1"/>
-          </a:fillRef>
-          <a:effectRef idx="0">
-            <a:schemeClr val="accent1"/>
-          </a:effectRef>
-          <a:fontRef idx="minor">
-            <a:schemeClr val="lt1"/>
-          </a:fontRef>
-        </p:style>
-        <p:txBody>
-          <a:bodyPr rtlCol="0" anchor="ctr"/>
-          <a:lstStyle/>
-          <a:p>
-            <a:pPr algn="ctr"/>
-            <a:r>
-              <a:rPr lang="en-US" sz="1400" dirty="0">
-                <a:solidFill>
-                  <a:schemeClr val="tx1"/>
-                </a:solidFill>
-              </a:rPr>
-              <a:t>Show / hide additional information in the plot, </a:t>
-            </a:r>
-            <a:br>
-              <a:rPr lang="en-US" sz="1400" dirty="0">
-                <a:solidFill>
-                  <a:schemeClr val="tx1"/>
-                </a:solidFill>
-              </a:rPr>
-            </a:br>
-            <a:r>
-              <a:rPr lang="en-US" sz="1400" dirty="0">
-                <a:solidFill>
-                  <a:schemeClr val="tx1"/>
-                </a:solidFill>
-              </a:rPr>
-              <a:t>e. g. future open orders</a:t>
+              <a:t> subsection shows the attributes of the selected article as well as the best-fitting methods for short-term and long-term forecasts</a:t>
             </a:r>
           </a:p>
         </p:txBody>
@@ -13762,7 +13843,7 @@
     </p:spTree>
     <p:extLst>
       <p:ext uri="{BB962C8B-B14F-4D97-AF65-F5344CB8AC3E}">
-        <p14:creationId xmlns:p14="http://schemas.microsoft.com/office/powerpoint/2010/main" val="2450177843"/>
+        <p14:creationId xmlns:p14="http://schemas.microsoft.com/office/powerpoint/2010/main" val="2103828319"/>
       </p:ext>
     </p:extLst>
   </p:cSld>
@@ -13791,10 +13872,10 @@
       </p:grpSpPr>
       <p:pic>
         <p:nvPicPr>
-          <p:cNvPr id="4" name="Grafik 3">
-            <a:extLst>
-              <a:ext uri="{FF2B5EF4-FFF2-40B4-BE49-F238E27FC236}">
-                <a16:creationId xmlns:a16="http://schemas.microsoft.com/office/drawing/2014/main" id="{1A69C53D-463A-460B-9008-0B8557C8468D}"/>
+          <p:cNvPr id="3" name="Grafik 2">
+            <a:extLst>
+              <a:ext uri="{FF2B5EF4-FFF2-40B4-BE49-F238E27FC236}">
+                <a16:creationId xmlns:a16="http://schemas.microsoft.com/office/drawing/2014/main" id="{6BB68CCA-4F88-43CA-81BA-1E8C1A9FE5B7}"/>
               </a:ext>
             </a:extLst>
           </p:cNvPr>
@@ -13803,16 +13884,15 @@
           </p:cNvPicPr>
           <p:nvPr/>
         </p:nvPicPr>
-        <p:blipFill>
+        <p:blipFill rotWithShape="1">
           <a:blip r:embed="rId2"/>
-          <a:stretch>
-            <a:fillRect/>
-          </a:stretch>
+          <a:srcRect t="1" b="579"/>
+          <a:stretch/>
         </p:blipFill>
         <p:spPr>
           <a:xfrm>
             <a:off x="0" y="80628"/>
-            <a:ext cx="12192000" cy="5949950"/>
+            <a:ext cx="12192000" cy="6012668"/>
           </a:xfrm>
           <a:prstGeom prst="rect">
             <a:avLst/>
@@ -13871,7 +13951,7 @@
                 <a:latin typeface="Arial" panose="020B0604020202020204"/>
                 <a:cs typeface="Arial"/>
               </a:rPr>
-              <a:t>2/22/2022</a:t>
+              <a:t>5/23/2022</a:t>
             </a:fld>
             <a:endParaRPr kumimoji="0" lang="en-US" sz="900" b="0" i="0" u="none" strike="noStrike" kern="1200" cap="none" spc="0" normalizeH="0" baseline="0">
               <a:ln>
@@ -13994,8 +14074,8 @@
         </p:nvSpPr>
         <p:spPr>
           <a:xfrm>
-            <a:off x="228600" y="4613807"/>
-            <a:ext cx="11734800" cy="1482193"/>
+            <a:off x="234887" y="2675115"/>
+            <a:ext cx="11734800" cy="1044327"/>
           </a:xfrm>
           <a:solidFill>
             <a:srgbClr val="FFFFFF">
@@ -14018,7 +14098,7 @@
             </a:pPr>
             <a:r>
               <a:rPr lang="en-US" b="1" dirty="0"/>
-              <a:t>Statistics</a:t>
+              <a:t>Forecast Methods</a:t>
             </a:r>
           </a:p>
           <a:p>
@@ -14032,1668 +14112,6 @@
             </a:pPr>
             <a:r>
               <a:rPr lang="en-US" dirty="0"/>
-              <a:t>The Statistics section features tables and bar charts which show the ratios of different attributes of the selected </a:t>
-            </a:r>
-            <a:r>
-              <a:rPr lang="en-US" dirty="0" err="1"/>
-              <a:t>Infoprovider</a:t>
-            </a:r>
-            <a:r>
-              <a:rPr lang="en-US" dirty="0"/>
-              <a:t> aggregated over all articles</a:t>
-            </a:r>
-          </a:p>
-          <a:p>
-            <a:pPr>
-              <a:lnSpc>
-                <a:spcPct val="100000"/>
-              </a:lnSpc>
-              <a:spcBef>
-                <a:spcPts val="600"/>
-              </a:spcBef>
-            </a:pPr>
-            <a:r>
-              <a:rPr lang="en-US" dirty="0"/>
-              <a:t>For each attribute two different ratios are calculated. One with respect to the number of articles and one weighted with the average demand of the last 12 months.</a:t>
-            </a:r>
-          </a:p>
-        </p:txBody>
-      </p:sp>
-      <p:sp>
-        <p:nvSpPr>
-          <p:cNvPr id="9" name="Sprechblase: rechteckig mit abgerundeten Ecken 8">
-            <a:extLst>
-              <a:ext uri="{FF2B5EF4-FFF2-40B4-BE49-F238E27FC236}">
-                <a16:creationId xmlns:a16="http://schemas.microsoft.com/office/drawing/2014/main" id="{194D3C90-27B1-4235-A376-A222A814B015}"/>
-              </a:ext>
-            </a:extLst>
-          </p:cNvPr>
-          <p:cNvSpPr/>
-          <p:nvPr/>
-        </p:nvSpPr>
-        <p:spPr>
-          <a:xfrm>
-            <a:off x="9156340" y="1772816"/>
-            <a:ext cx="2916048" cy="1152128"/>
-          </a:xfrm>
-          <a:prstGeom prst="wedgeRoundRectCallout">
-            <a:avLst>
-              <a:gd name="adj1" fmla="val 25934"/>
-              <a:gd name="adj2" fmla="val -122622"/>
-              <a:gd name="adj3" fmla="val 16667"/>
-            </a:avLst>
-          </a:prstGeom>
-          <a:solidFill>
-            <a:srgbClr val="FFFFCC"/>
-          </a:solidFill>
-          <a:ln>
-            <a:solidFill>
-              <a:schemeClr val="bg1">
-                <a:lumMod val="85000"/>
-              </a:schemeClr>
-            </a:solidFill>
-          </a:ln>
-        </p:spPr>
-        <p:style>
-          <a:lnRef idx="2">
-            <a:schemeClr val="accent1">
-              <a:shade val="50000"/>
-            </a:schemeClr>
-          </a:lnRef>
-          <a:fillRef idx="1">
-            <a:schemeClr val="accent1"/>
-          </a:fillRef>
-          <a:effectRef idx="0">
-            <a:schemeClr val="accent1"/>
-          </a:effectRef>
-          <a:fontRef idx="minor">
-            <a:schemeClr val="lt1"/>
-          </a:fontRef>
-        </p:style>
-        <p:txBody>
-          <a:bodyPr rtlCol="0" anchor="ctr"/>
-          <a:lstStyle/>
-          <a:p>
-            <a:pPr algn="ctr"/>
-            <a:r>
-              <a:rPr lang="en-US" sz="1400" dirty="0">
-                <a:solidFill>
-                  <a:schemeClr val="tx1"/>
-                </a:solidFill>
-              </a:rPr>
-              <a:t>Filter the articles which are included in the analysis</a:t>
-            </a:r>
-            <a:br>
-              <a:rPr lang="en-US" sz="1400" dirty="0">
-                <a:solidFill>
-                  <a:schemeClr val="tx1"/>
-                </a:solidFill>
-              </a:rPr>
-            </a:br>
-            <a:r>
-              <a:rPr lang="en-US" sz="1400" dirty="0">
-                <a:solidFill>
-                  <a:schemeClr val="tx1"/>
-                </a:solidFill>
-              </a:rPr>
-              <a:t>e. g. by article number / text, customer, SBU, seasonality, ABC or warning type</a:t>
-            </a:r>
-          </a:p>
-        </p:txBody>
-      </p:sp>
-    </p:spTree>
-    <p:extLst>
-      <p:ext uri="{BB962C8B-B14F-4D97-AF65-F5344CB8AC3E}">
-        <p14:creationId xmlns:p14="http://schemas.microsoft.com/office/powerpoint/2010/main" val="545339574"/>
-      </p:ext>
-    </p:extLst>
-  </p:cSld>
-  <p:clrMapOvr>
-    <a:masterClrMapping/>
-  </p:clrMapOvr>
-</p:sld>
-</file>
-
-<file path=ppt/slides/slide5.xml><?xml version="1.0" encoding="utf-8"?>
-<p:sld xmlns:a="http://schemas.openxmlformats.org/drawingml/2006/main" xmlns:r="http://schemas.openxmlformats.org/officeDocument/2006/relationships" xmlns:p="http://schemas.openxmlformats.org/presentationml/2006/main">
-  <p:cSld>
-    <p:spTree>
-      <p:nvGrpSpPr>
-        <p:cNvPr id="1" name=""/>
-        <p:cNvGrpSpPr/>
-        <p:nvPr/>
-      </p:nvGrpSpPr>
-      <p:grpSpPr>
-        <a:xfrm>
-          <a:off x="0" y="0"/>
-          <a:ext cx="0" cy="0"/>
-          <a:chOff x="0" y="0"/>
-          <a:chExt cx="0" cy="0"/>
-        </a:xfrm>
-      </p:grpSpPr>
-      <p:pic>
-        <p:nvPicPr>
-          <p:cNvPr id="3" name="Grafik 2">
-            <a:extLst>
-              <a:ext uri="{FF2B5EF4-FFF2-40B4-BE49-F238E27FC236}">
-                <a16:creationId xmlns:a16="http://schemas.microsoft.com/office/drawing/2014/main" id="{FA8E0D31-EC64-4788-A36D-136CABC8B747}"/>
-              </a:ext>
-            </a:extLst>
-          </p:cNvPr>
-          <p:cNvPicPr>
-            <a:picLocks noChangeAspect="1"/>
-          </p:cNvPicPr>
-          <p:nvPr/>
-        </p:nvPicPr>
-        <p:blipFill>
-          <a:blip r:embed="rId2"/>
-          <a:stretch>
-            <a:fillRect/>
-          </a:stretch>
-        </p:blipFill>
-        <p:spPr>
-          <a:xfrm>
-            <a:off x="0" y="80628"/>
-            <a:ext cx="12192000" cy="5949950"/>
-          </a:xfrm>
-          <a:prstGeom prst="rect">
-            <a:avLst/>
-          </a:prstGeom>
-        </p:spPr>
-      </p:pic>
-      <p:sp>
-        <p:nvSpPr>
-          <p:cNvPr id="5" name="Datumsplatzhalter 4">
-            <a:extLst>
-              <a:ext uri="{FF2B5EF4-FFF2-40B4-BE49-F238E27FC236}">
-                <a16:creationId xmlns:a16="http://schemas.microsoft.com/office/drawing/2014/main" id="{1E4BC56F-B08B-47A1-B4B9-A18090D79063}"/>
-              </a:ext>
-            </a:extLst>
-          </p:cNvPr>
-          <p:cNvSpPr>
-            <a:spLocks noGrp="1"/>
-          </p:cNvSpPr>
-          <p:nvPr>
-            <p:ph type="dt" sz="half" idx="11"/>
-          </p:nvPr>
-        </p:nvSpPr>
-        <p:spPr/>
-        <p:txBody>
-          <a:bodyPr/>
-          <a:lstStyle/>
-          <a:p>
-            <a:pPr marL="0" marR="0" lvl="0" indent="0" algn="l" defTabSz="914400" rtl="0" eaLnBrk="1" fontAlgn="auto" latinLnBrk="0" hangingPunct="1">
-              <a:lnSpc>
-                <a:spcPct val="100000"/>
-              </a:lnSpc>
-              <a:spcBef>
-                <a:spcPts val="110"/>
-              </a:spcBef>
-              <a:spcAft>
-                <a:spcPts val="110"/>
-              </a:spcAft>
-              <a:buClrTx/>
-              <a:buSzTx/>
-              <a:buFontTx/>
-              <a:buNone/>
-              <a:tabLst/>
-              <a:defRPr/>
-            </a:pPr>
-            <a:fld id="{C0E33138-ACF4-4AA0-BCDB-3A9F2443B8D9}" type="datetime1">
-              <a:rPr kumimoji="0" lang="en-US" sz="900" b="0" i="0" u="none" strike="noStrike" kern="1200" cap="none" spc="0" normalizeH="0" baseline="0" smtClean="0">
-                <a:ln>
-                  <a:noFill/>
-                </a:ln>
-                <a:solidFill>
-                  <a:srgbClr val="000000"/>
-                </a:solidFill>
-                <a:effectLst/>
-                <a:uLnTx/>
-                <a:uFillTx/>
-                <a:latin typeface="Arial" panose="020B0604020202020204"/>
-                <a:cs typeface="Arial"/>
-              </a:rPr>
-              <a:t>2/22/2022</a:t>
-            </a:fld>
-            <a:endParaRPr kumimoji="0" lang="en-US" sz="900" b="0" i="0" u="none" strike="noStrike" kern="1200" cap="none" spc="0" normalizeH="0" baseline="0">
-              <a:ln>
-                <a:noFill/>
-              </a:ln>
-              <a:solidFill>
-                <a:srgbClr val="000000"/>
-              </a:solidFill>
-              <a:effectLst/>
-              <a:uLnTx/>
-              <a:uFillTx/>
-              <a:latin typeface="Arial" panose="020B0604020202020204"/>
-              <a:cs typeface="Arial"/>
-            </a:endParaRPr>
-          </a:p>
-        </p:txBody>
-      </p:sp>
-      <p:sp>
-        <p:nvSpPr>
-          <p:cNvPr id="6" name="Foliennummernplatzhalter 5">
-            <a:extLst>
-              <a:ext uri="{FF2B5EF4-FFF2-40B4-BE49-F238E27FC236}">
-                <a16:creationId xmlns:a16="http://schemas.microsoft.com/office/drawing/2014/main" id="{37E60DB8-2B52-4970-9032-41E73B37F2A2}"/>
-              </a:ext>
-            </a:extLst>
-          </p:cNvPr>
-          <p:cNvSpPr>
-            <a:spLocks noGrp="1"/>
-          </p:cNvSpPr>
-          <p:nvPr>
-            <p:ph type="sldNum" sz="quarter" idx="12"/>
-          </p:nvPr>
-        </p:nvSpPr>
-        <p:spPr/>
-        <p:txBody>
-          <a:bodyPr/>
-          <a:lstStyle/>
-          <a:p>
-            <a:pPr marL="0" marR="0" lvl="0" indent="0" algn="l" defTabSz="914400" rtl="0" eaLnBrk="1" fontAlgn="auto" latinLnBrk="0" hangingPunct="1">
-              <a:lnSpc>
-                <a:spcPct val="100000"/>
-              </a:lnSpc>
-              <a:spcBef>
-                <a:spcPts val="110"/>
-              </a:spcBef>
-              <a:spcAft>
-                <a:spcPts val="110"/>
-              </a:spcAft>
-              <a:buClrTx/>
-              <a:buSzTx/>
-              <a:buFontTx/>
-              <a:buNone/>
-              <a:tabLst/>
-              <a:defRPr/>
-            </a:pPr>
-            <a:fld id="{D7C0CCF7-DF53-4ADB-AAD8-9742C01AD446}" type="slidenum">
-              <a:rPr kumimoji="0" lang="en-US" sz="900" b="1" i="0" u="none" strike="noStrike" kern="1200" cap="none" spc="0" normalizeH="0" baseline="0" smtClean="0">
-                <a:ln>
-                  <a:noFill/>
-                </a:ln>
-                <a:solidFill>
-                  <a:srgbClr val="000000"/>
-                </a:solidFill>
-                <a:effectLst/>
-                <a:uLnTx/>
-                <a:uFillTx/>
-                <a:latin typeface="Arial" panose="020B0604020202020204"/>
-                <a:cs typeface="Arial"/>
-              </a:rPr>
-              <a:pPr marL="0" marR="0" lvl="0" indent="0" algn="l" defTabSz="914400" rtl="0" eaLnBrk="1" fontAlgn="auto" latinLnBrk="0" hangingPunct="1">
-                <a:lnSpc>
-                  <a:spcPct val="100000"/>
-                </a:lnSpc>
-                <a:spcBef>
-                  <a:spcPts val="110"/>
-                </a:spcBef>
-                <a:spcAft>
-                  <a:spcPts val="110"/>
-                </a:spcAft>
-                <a:buClrTx/>
-                <a:buSzTx/>
-                <a:buFontTx/>
-                <a:buNone/>
-                <a:tabLst/>
-                <a:defRPr/>
-              </a:pPr>
-              <a:t>5</a:t>
-            </a:fld>
-            <a:endParaRPr kumimoji="0" lang="en-US" sz="900" b="1" i="0" u="none" strike="noStrike" kern="1200" cap="none" spc="0" normalizeH="0" baseline="0">
-              <a:ln>
-                <a:noFill/>
-              </a:ln>
-              <a:solidFill>
-                <a:srgbClr val="000000"/>
-              </a:solidFill>
-              <a:effectLst/>
-              <a:uLnTx/>
-              <a:uFillTx/>
-              <a:latin typeface="Arial" panose="020B0604020202020204"/>
-              <a:cs typeface="Arial"/>
-            </a:endParaRPr>
-          </a:p>
-        </p:txBody>
-      </p:sp>
-      <p:sp>
-        <p:nvSpPr>
-          <p:cNvPr id="11" name="Textplatzhalter 10">
-            <a:extLst>
-              <a:ext uri="{FF2B5EF4-FFF2-40B4-BE49-F238E27FC236}">
-                <a16:creationId xmlns:a16="http://schemas.microsoft.com/office/drawing/2014/main" id="{19D7EBED-DD57-4BEF-8EA1-9BE44C2D015A}"/>
-              </a:ext>
-            </a:extLst>
-          </p:cNvPr>
-          <p:cNvSpPr>
-            <a:spLocks noGrp="1"/>
-          </p:cNvSpPr>
-          <p:nvPr>
-            <p:ph type="body" idx="1"/>
-          </p:nvPr>
-        </p:nvSpPr>
-        <p:spPr>
-          <a:xfrm>
-            <a:off x="228600" y="4613807"/>
-            <a:ext cx="11734800" cy="1482193"/>
-          </a:xfrm>
-          <a:solidFill>
-            <a:srgbClr val="FFFFFF">
-              <a:alpha val="80000"/>
-            </a:srgbClr>
-          </a:solidFill>
-        </p:spPr>
-        <p:txBody>
-          <a:bodyPr/>
-          <a:lstStyle/>
-          <a:p>
-            <a:pPr marL="0" indent="0">
-              <a:lnSpc>
-                <a:spcPct val="100000"/>
-              </a:lnSpc>
-              <a:spcBef>
-                <a:spcPts val="600"/>
-              </a:spcBef>
-              <a:buNone/>
-            </a:pPr>
-            <a:r>
-              <a:rPr lang="en-US" b="1" dirty="0"/>
-              <a:t>Article Forecast</a:t>
-            </a:r>
-          </a:p>
-          <a:p>
-            <a:pPr>
-              <a:lnSpc>
-                <a:spcPct val="100000"/>
-              </a:lnSpc>
-              <a:spcBef>
-                <a:spcPts val="600"/>
-              </a:spcBef>
-            </a:pPr>
-            <a:r>
-              <a:rPr lang="en-US" dirty="0"/>
-              <a:t>In the Article Forecast section the results of the forecast run are displayed for the selected article. Additional subsections with further information can be selected below the plot</a:t>
-            </a:r>
-          </a:p>
-          <a:p>
-            <a:pPr>
-              <a:lnSpc>
-                <a:spcPct val="100000"/>
-              </a:lnSpc>
-              <a:spcBef>
-                <a:spcPts val="600"/>
-              </a:spcBef>
-            </a:pPr>
-            <a:r>
-              <a:rPr lang="en-US" dirty="0"/>
-              <a:t>The </a:t>
-            </a:r>
-            <a:r>
-              <a:rPr lang="en-US" b="1" dirty="0"/>
-              <a:t>Article Forecast </a:t>
-            </a:r>
-            <a:r>
-              <a:rPr lang="en-US" dirty="0"/>
-              <a:t>subsection shows a table of the historical data and forecast of the selected article or article customer combination</a:t>
-            </a:r>
-          </a:p>
-        </p:txBody>
-      </p:sp>
-      <p:sp>
-        <p:nvSpPr>
-          <p:cNvPr id="9" name="Sprechblase: rechteckig mit abgerundeten Ecken 8">
-            <a:extLst>
-              <a:ext uri="{FF2B5EF4-FFF2-40B4-BE49-F238E27FC236}">
-                <a16:creationId xmlns:a16="http://schemas.microsoft.com/office/drawing/2014/main" id="{194D3C90-27B1-4235-A376-A222A814B015}"/>
-              </a:ext>
-            </a:extLst>
-          </p:cNvPr>
-          <p:cNvSpPr/>
-          <p:nvPr/>
-        </p:nvSpPr>
-        <p:spPr>
-          <a:xfrm>
-            <a:off x="7212124" y="764704"/>
-            <a:ext cx="2916048" cy="756084"/>
-          </a:xfrm>
-          <a:prstGeom prst="wedgeRoundRectCallout">
-            <a:avLst>
-              <a:gd name="adj1" fmla="val 64743"/>
-              <a:gd name="adj2" fmla="val -30421"/>
-              <a:gd name="adj3" fmla="val 16667"/>
-            </a:avLst>
-          </a:prstGeom>
-          <a:solidFill>
-            <a:srgbClr val="FFFFCC"/>
-          </a:solidFill>
-          <a:ln>
-            <a:solidFill>
-              <a:schemeClr val="bg1">
-                <a:lumMod val="85000"/>
-              </a:schemeClr>
-            </a:solidFill>
-          </a:ln>
-        </p:spPr>
-        <p:style>
-          <a:lnRef idx="2">
-            <a:schemeClr val="accent1">
-              <a:shade val="50000"/>
-            </a:schemeClr>
-          </a:lnRef>
-          <a:fillRef idx="1">
-            <a:schemeClr val="accent1"/>
-          </a:fillRef>
-          <a:effectRef idx="0">
-            <a:schemeClr val="accent1"/>
-          </a:effectRef>
-          <a:fontRef idx="minor">
-            <a:schemeClr val="lt1"/>
-          </a:fontRef>
-        </p:style>
-        <p:txBody>
-          <a:bodyPr rtlCol="0" anchor="ctr"/>
-          <a:lstStyle/>
-          <a:p>
-            <a:pPr algn="ctr"/>
-            <a:r>
-              <a:rPr lang="de-DE" sz="1400" dirty="0">
-                <a:solidFill>
-                  <a:schemeClr val="tx1"/>
-                </a:solidFill>
-              </a:rPr>
-              <a:t>C</a:t>
-            </a:r>
-            <a:r>
-              <a:rPr lang="en-US" sz="1400" dirty="0">
-                <a:solidFill>
-                  <a:schemeClr val="tx1"/>
-                </a:solidFill>
-              </a:rPr>
-              <a:t>hose between showing the plot on article level or for a specific customer of this article</a:t>
-            </a:r>
-          </a:p>
-        </p:txBody>
-      </p:sp>
-      <p:sp>
-        <p:nvSpPr>
-          <p:cNvPr id="10" name="Sprechblase: rechteckig mit abgerundeten Ecken 9">
-            <a:extLst>
-              <a:ext uri="{FF2B5EF4-FFF2-40B4-BE49-F238E27FC236}">
-                <a16:creationId xmlns:a16="http://schemas.microsoft.com/office/drawing/2014/main" id="{209E3891-E690-4A97-BE2B-3B105E2BAB67}"/>
-              </a:ext>
-            </a:extLst>
-          </p:cNvPr>
-          <p:cNvSpPr/>
-          <p:nvPr/>
-        </p:nvSpPr>
-        <p:spPr>
-          <a:xfrm>
-            <a:off x="983432" y="2744924"/>
-            <a:ext cx="2340260" cy="504056"/>
-          </a:xfrm>
-          <a:prstGeom prst="wedgeRoundRectCallout">
-            <a:avLst>
-              <a:gd name="adj1" fmla="val -53475"/>
-              <a:gd name="adj2" fmla="val 130968"/>
-              <a:gd name="adj3" fmla="val 16667"/>
-            </a:avLst>
-          </a:prstGeom>
-          <a:solidFill>
-            <a:srgbClr val="FFFFCC"/>
-          </a:solidFill>
-          <a:ln>
-            <a:solidFill>
-              <a:schemeClr val="bg1">
-                <a:lumMod val="85000"/>
-              </a:schemeClr>
-            </a:solidFill>
-          </a:ln>
-        </p:spPr>
-        <p:style>
-          <a:lnRef idx="2">
-            <a:schemeClr val="accent1">
-              <a:shade val="50000"/>
-            </a:schemeClr>
-          </a:lnRef>
-          <a:fillRef idx="1">
-            <a:schemeClr val="accent1"/>
-          </a:fillRef>
-          <a:effectRef idx="0">
-            <a:schemeClr val="accent1"/>
-          </a:effectRef>
-          <a:fontRef idx="minor">
-            <a:schemeClr val="lt1"/>
-          </a:fontRef>
-        </p:style>
-        <p:txBody>
-          <a:bodyPr rtlCol="0" anchor="ctr"/>
-          <a:lstStyle/>
-          <a:p>
-            <a:pPr algn="ctr"/>
-            <a:r>
-              <a:rPr lang="en-US" sz="1400" dirty="0">
-                <a:solidFill>
-                  <a:schemeClr val="tx1"/>
-                </a:solidFill>
-              </a:rPr>
-              <a:t>Use the sliders to zoom in on a specific time frame</a:t>
-            </a:r>
-          </a:p>
-        </p:txBody>
-      </p:sp>
-      <p:sp>
-        <p:nvSpPr>
-          <p:cNvPr id="12" name="Sprechblase: rechteckig mit abgerundeten Ecken 11">
-            <a:extLst>
-              <a:ext uri="{FF2B5EF4-FFF2-40B4-BE49-F238E27FC236}">
-                <a16:creationId xmlns:a16="http://schemas.microsoft.com/office/drawing/2014/main" id="{1997027B-FCFC-4951-B826-E1F17E1CAFEA}"/>
-              </a:ext>
-            </a:extLst>
-          </p:cNvPr>
-          <p:cNvSpPr/>
-          <p:nvPr/>
-        </p:nvSpPr>
-        <p:spPr>
-          <a:xfrm>
-            <a:off x="6744072" y="2564904"/>
-            <a:ext cx="2340260" cy="756084"/>
-          </a:xfrm>
-          <a:prstGeom prst="wedgeRoundRectCallout">
-            <a:avLst>
-              <a:gd name="adj1" fmla="val 34341"/>
-              <a:gd name="adj2" fmla="val 107020"/>
-              <a:gd name="adj3" fmla="val 16667"/>
-            </a:avLst>
-          </a:prstGeom>
-          <a:solidFill>
-            <a:srgbClr val="FFFFCC"/>
-          </a:solidFill>
-          <a:ln>
-            <a:solidFill>
-              <a:schemeClr val="bg1">
-                <a:lumMod val="85000"/>
-              </a:schemeClr>
-            </a:solidFill>
-          </a:ln>
-        </p:spPr>
-        <p:style>
-          <a:lnRef idx="2">
-            <a:schemeClr val="accent1">
-              <a:shade val="50000"/>
-            </a:schemeClr>
-          </a:lnRef>
-          <a:fillRef idx="1">
-            <a:schemeClr val="accent1"/>
-          </a:fillRef>
-          <a:effectRef idx="0">
-            <a:schemeClr val="accent1"/>
-          </a:effectRef>
-          <a:fontRef idx="minor">
-            <a:schemeClr val="lt1"/>
-          </a:fontRef>
-        </p:style>
-        <p:txBody>
-          <a:bodyPr rtlCol="0" anchor="ctr"/>
-          <a:lstStyle/>
-          <a:p>
-            <a:pPr algn="ctr"/>
-            <a:r>
-              <a:rPr lang="en-US" sz="1400" dirty="0">
-                <a:solidFill>
-                  <a:schemeClr val="tx1"/>
-                </a:solidFill>
-              </a:rPr>
-              <a:t>Show / hide additional information in the plot, </a:t>
-            </a:r>
-            <a:br>
-              <a:rPr lang="en-US" sz="1400" dirty="0">
-                <a:solidFill>
-                  <a:schemeClr val="tx1"/>
-                </a:solidFill>
-              </a:rPr>
-            </a:br>
-            <a:r>
-              <a:rPr lang="en-US" sz="1400" dirty="0">
-                <a:solidFill>
-                  <a:schemeClr val="tx1"/>
-                </a:solidFill>
-              </a:rPr>
-              <a:t>e. g. future open orders</a:t>
-            </a:r>
-          </a:p>
-        </p:txBody>
-      </p:sp>
-    </p:spTree>
-    <p:extLst>
-      <p:ext uri="{BB962C8B-B14F-4D97-AF65-F5344CB8AC3E}">
-        <p14:creationId xmlns:p14="http://schemas.microsoft.com/office/powerpoint/2010/main" val="1519722111"/>
-      </p:ext>
-    </p:extLst>
-  </p:cSld>
-  <p:clrMapOvr>
-    <a:masterClrMapping/>
-  </p:clrMapOvr>
-</p:sld>
-</file>
-
-<file path=ppt/slides/slide6.xml><?xml version="1.0" encoding="utf-8"?>
-<p:sld xmlns:a="http://schemas.openxmlformats.org/drawingml/2006/main" xmlns:r="http://schemas.openxmlformats.org/officeDocument/2006/relationships" xmlns:p="http://schemas.openxmlformats.org/presentationml/2006/main">
-  <p:cSld>
-    <p:spTree>
-      <p:nvGrpSpPr>
-        <p:cNvPr id="1" name=""/>
-        <p:cNvGrpSpPr/>
-        <p:nvPr/>
-      </p:nvGrpSpPr>
-      <p:grpSpPr>
-        <a:xfrm>
-          <a:off x="0" y="0"/>
-          <a:ext cx="0" cy="0"/>
-          <a:chOff x="0" y="0"/>
-          <a:chExt cx="0" cy="0"/>
-        </a:xfrm>
-      </p:grpSpPr>
-      <p:pic>
-        <p:nvPicPr>
-          <p:cNvPr id="4" name="Grafik 3">
-            <a:extLst>
-              <a:ext uri="{FF2B5EF4-FFF2-40B4-BE49-F238E27FC236}">
-                <a16:creationId xmlns:a16="http://schemas.microsoft.com/office/drawing/2014/main" id="{0896EA45-9AFF-480D-931C-9905B9D8F782}"/>
-              </a:ext>
-            </a:extLst>
-          </p:cNvPr>
-          <p:cNvPicPr>
-            <a:picLocks noChangeAspect="1"/>
-          </p:cNvPicPr>
-          <p:nvPr/>
-        </p:nvPicPr>
-        <p:blipFill>
-          <a:blip r:embed="rId2"/>
-          <a:stretch>
-            <a:fillRect/>
-          </a:stretch>
-        </p:blipFill>
-        <p:spPr>
-          <a:xfrm>
-            <a:off x="0" y="80628"/>
-            <a:ext cx="12192000" cy="5949950"/>
-          </a:xfrm>
-          <a:prstGeom prst="rect">
-            <a:avLst/>
-          </a:prstGeom>
-        </p:spPr>
-      </p:pic>
-      <p:sp>
-        <p:nvSpPr>
-          <p:cNvPr id="5" name="Datumsplatzhalter 4">
-            <a:extLst>
-              <a:ext uri="{FF2B5EF4-FFF2-40B4-BE49-F238E27FC236}">
-                <a16:creationId xmlns:a16="http://schemas.microsoft.com/office/drawing/2014/main" id="{1E4BC56F-B08B-47A1-B4B9-A18090D79063}"/>
-              </a:ext>
-            </a:extLst>
-          </p:cNvPr>
-          <p:cNvSpPr>
-            <a:spLocks noGrp="1"/>
-          </p:cNvSpPr>
-          <p:nvPr>
-            <p:ph type="dt" sz="half" idx="11"/>
-          </p:nvPr>
-        </p:nvSpPr>
-        <p:spPr/>
-        <p:txBody>
-          <a:bodyPr/>
-          <a:lstStyle/>
-          <a:p>
-            <a:pPr marL="0" marR="0" lvl="0" indent="0" algn="l" defTabSz="914400" rtl="0" eaLnBrk="1" fontAlgn="auto" latinLnBrk="0" hangingPunct="1">
-              <a:lnSpc>
-                <a:spcPct val="100000"/>
-              </a:lnSpc>
-              <a:spcBef>
-                <a:spcPts val="110"/>
-              </a:spcBef>
-              <a:spcAft>
-                <a:spcPts val="110"/>
-              </a:spcAft>
-              <a:buClrTx/>
-              <a:buSzTx/>
-              <a:buFontTx/>
-              <a:buNone/>
-              <a:tabLst/>
-              <a:defRPr/>
-            </a:pPr>
-            <a:fld id="{C0E33138-ACF4-4AA0-BCDB-3A9F2443B8D9}" type="datetime1">
-              <a:rPr kumimoji="0" lang="en-US" sz="900" b="0" i="0" u="none" strike="noStrike" kern="1200" cap="none" spc="0" normalizeH="0" baseline="0" smtClean="0">
-                <a:ln>
-                  <a:noFill/>
-                </a:ln>
-                <a:solidFill>
-                  <a:srgbClr val="000000"/>
-                </a:solidFill>
-                <a:effectLst/>
-                <a:uLnTx/>
-                <a:uFillTx/>
-                <a:latin typeface="Arial" panose="020B0604020202020204"/>
-                <a:cs typeface="Arial"/>
-              </a:rPr>
-              <a:t>2/22/2022</a:t>
-            </a:fld>
-            <a:endParaRPr kumimoji="0" lang="en-US" sz="900" b="0" i="0" u="none" strike="noStrike" kern="1200" cap="none" spc="0" normalizeH="0" baseline="0">
-              <a:ln>
-                <a:noFill/>
-              </a:ln>
-              <a:solidFill>
-                <a:srgbClr val="000000"/>
-              </a:solidFill>
-              <a:effectLst/>
-              <a:uLnTx/>
-              <a:uFillTx/>
-              <a:latin typeface="Arial" panose="020B0604020202020204"/>
-              <a:cs typeface="Arial"/>
-            </a:endParaRPr>
-          </a:p>
-        </p:txBody>
-      </p:sp>
-      <p:sp>
-        <p:nvSpPr>
-          <p:cNvPr id="6" name="Foliennummernplatzhalter 5">
-            <a:extLst>
-              <a:ext uri="{FF2B5EF4-FFF2-40B4-BE49-F238E27FC236}">
-                <a16:creationId xmlns:a16="http://schemas.microsoft.com/office/drawing/2014/main" id="{37E60DB8-2B52-4970-9032-41E73B37F2A2}"/>
-              </a:ext>
-            </a:extLst>
-          </p:cNvPr>
-          <p:cNvSpPr>
-            <a:spLocks noGrp="1"/>
-          </p:cNvSpPr>
-          <p:nvPr>
-            <p:ph type="sldNum" sz="quarter" idx="12"/>
-          </p:nvPr>
-        </p:nvSpPr>
-        <p:spPr/>
-        <p:txBody>
-          <a:bodyPr/>
-          <a:lstStyle/>
-          <a:p>
-            <a:pPr marL="0" marR="0" lvl="0" indent="0" algn="l" defTabSz="914400" rtl="0" eaLnBrk="1" fontAlgn="auto" latinLnBrk="0" hangingPunct="1">
-              <a:lnSpc>
-                <a:spcPct val="100000"/>
-              </a:lnSpc>
-              <a:spcBef>
-                <a:spcPts val="110"/>
-              </a:spcBef>
-              <a:spcAft>
-                <a:spcPts val="110"/>
-              </a:spcAft>
-              <a:buClrTx/>
-              <a:buSzTx/>
-              <a:buFontTx/>
-              <a:buNone/>
-              <a:tabLst/>
-              <a:defRPr/>
-            </a:pPr>
-            <a:fld id="{D7C0CCF7-DF53-4ADB-AAD8-9742C01AD446}" type="slidenum">
-              <a:rPr kumimoji="0" lang="en-US" sz="900" b="1" i="0" u="none" strike="noStrike" kern="1200" cap="none" spc="0" normalizeH="0" baseline="0" smtClean="0">
-                <a:ln>
-                  <a:noFill/>
-                </a:ln>
-                <a:solidFill>
-                  <a:srgbClr val="000000"/>
-                </a:solidFill>
-                <a:effectLst/>
-                <a:uLnTx/>
-                <a:uFillTx/>
-                <a:latin typeface="Arial" panose="020B0604020202020204"/>
-                <a:cs typeface="Arial"/>
-              </a:rPr>
-              <a:pPr marL="0" marR="0" lvl="0" indent="0" algn="l" defTabSz="914400" rtl="0" eaLnBrk="1" fontAlgn="auto" latinLnBrk="0" hangingPunct="1">
-                <a:lnSpc>
-                  <a:spcPct val="100000"/>
-                </a:lnSpc>
-                <a:spcBef>
-                  <a:spcPts val="110"/>
-                </a:spcBef>
-                <a:spcAft>
-                  <a:spcPts val="110"/>
-                </a:spcAft>
-                <a:buClrTx/>
-                <a:buSzTx/>
-                <a:buFontTx/>
-                <a:buNone/>
-                <a:tabLst/>
-                <a:defRPr/>
-              </a:pPr>
-              <a:t>6</a:t>
-            </a:fld>
-            <a:endParaRPr kumimoji="0" lang="en-US" sz="900" b="1" i="0" u="none" strike="noStrike" kern="1200" cap="none" spc="0" normalizeH="0" baseline="0">
-              <a:ln>
-                <a:noFill/>
-              </a:ln>
-              <a:solidFill>
-                <a:srgbClr val="000000"/>
-              </a:solidFill>
-              <a:effectLst/>
-              <a:uLnTx/>
-              <a:uFillTx/>
-              <a:latin typeface="Arial" panose="020B0604020202020204"/>
-              <a:cs typeface="Arial"/>
-            </a:endParaRPr>
-          </a:p>
-        </p:txBody>
-      </p:sp>
-      <p:sp>
-        <p:nvSpPr>
-          <p:cNvPr id="11" name="Textplatzhalter 10">
-            <a:extLst>
-              <a:ext uri="{FF2B5EF4-FFF2-40B4-BE49-F238E27FC236}">
-                <a16:creationId xmlns:a16="http://schemas.microsoft.com/office/drawing/2014/main" id="{19D7EBED-DD57-4BEF-8EA1-9BE44C2D015A}"/>
-              </a:ext>
-            </a:extLst>
-          </p:cNvPr>
-          <p:cNvSpPr>
-            <a:spLocks noGrp="1"/>
-          </p:cNvSpPr>
-          <p:nvPr>
-            <p:ph type="body" idx="1"/>
-          </p:nvPr>
-        </p:nvSpPr>
-        <p:spPr>
-          <a:xfrm>
-            <a:off x="234887" y="1952625"/>
-            <a:ext cx="11734800" cy="1980431"/>
-          </a:xfrm>
-          <a:solidFill>
-            <a:srgbClr val="FFFFFF">
-              <a:alpha val="80000"/>
-            </a:srgbClr>
-          </a:solidFill>
-        </p:spPr>
-        <p:txBody>
-          <a:bodyPr/>
-          <a:lstStyle/>
-          <a:p>
-            <a:pPr marL="0" indent="0">
-              <a:lnSpc>
-                <a:spcPct val="100000"/>
-              </a:lnSpc>
-              <a:spcBef>
-                <a:spcPts val="600"/>
-              </a:spcBef>
-              <a:buNone/>
-            </a:pPr>
-            <a:r>
-              <a:rPr lang="en-US" b="1" dirty="0"/>
-              <a:t>Article Forecast</a:t>
-            </a:r>
-          </a:p>
-          <a:p>
-            <a:pPr>
-              <a:lnSpc>
-                <a:spcPct val="100000"/>
-              </a:lnSpc>
-              <a:spcBef>
-                <a:spcPts val="600"/>
-              </a:spcBef>
-            </a:pPr>
-            <a:r>
-              <a:rPr lang="en-US" dirty="0"/>
-              <a:t>In the Article Forecast section the results of the forecast run are displayed for the selected article. Additional subsections with further information can be selected below the plot</a:t>
-            </a:r>
-          </a:p>
-          <a:p>
-            <a:pPr>
-              <a:lnSpc>
-                <a:spcPct val="100000"/>
-              </a:lnSpc>
-              <a:spcBef>
-                <a:spcPts val="600"/>
-              </a:spcBef>
-            </a:pPr>
-            <a:r>
-              <a:rPr lang="en-US" dirty="0"/>
-              <a:t>The </a:t>
-            </a:r>
-            <a:r>
-              <a:rPr lang="en-US" b="1" dirty="0"/>
-              <a:t>Information</a:t>
-            </a:r>
-            <a:r>
-              <a:rPr lang="en-US" dirty="0"/>
-              <a:t> subsection shows the attributes of the selected article as well as the best-fitting methods for short-term and long-term forecasts</a:t>
-            </a:r>
-          </a:p>
-        </p:txBody>
-      </p:sp>
-    </p:spTree>
-    <p:extLst>
-      <p:ext uri="{BB962C8B-B14F-4D97-AF65-F5344CB8AC3E}">
-        <p14:creationId xmlns:p14="http://schemas.microsoft.com/office/powerpoint/2010/main" val="2337657052"/>
-      </p:ext>
-    </p:extLst>
-  </p:cSld>
-  <p:clrMapOvr>
-    <a:masterClrMapping/>
-  </p:clrMapOvr>
-</p:sld>
-</file>
-
-<file path=ppt/slides/slide7.xml><?xml version="1.0" encoding="utf-8"?>
-<p:sld xmlns:a="http://schemas.openxmlformats.org/drawingml/2006/main" xmlns:r="http://schemas.openxmlformats.org/officeDocument/2006/relationships" xmlns:p="http://schemas.openxmlformats.org/presentationml/2006/main">
-  <p:cSld>
-    <p:spTree>
-      <p:nvGrpSpPr>
-        <p:cNvPr id="1" name=""/>
-        <p:cNvGrpSpPr/>
-        <p:nvPr/>
-      </p:nvGrpSpPr>
-      <p:grpSpPr>
-        <a:xfrm>
-          <a:off x="0" y="0"/>
-          <a:ext cx="0" cy="0"/>
-          <a:chOff x="0" y="0"/>
-          <a:chExt cx="0" cy="0"/>
-        </a:xfrm>
-      </p:grpSpPr>
-      <p:pic>
-        <p:nvPicPr>
-          <p:cNvPr id="3" name="Grafik 2">
-            <a:extLst>
-              <a:ext uri="{FF2B5EF4-FFF2-40B4-BE49-F238E27FC236}">
-                <a16:creationId xmlns:a16="http://schemas.microsoft.com/office/drawing/2014/main" id="{0FD008B3-B8F6-45F1-B61F-36FA76F32C24}"/>
-              </a:ext>
-            </a:extLst>
-          </p:cNvPr>
-          <p:cNvPicPr>
-            <a:picLocks noChangeAspect="1"/>
-          </p:cNvPicPr>
-          <p:nvPr/>
-        </p:nvPicPr>
-        <p:blipFill>
-          <a:blip r:embed="rId2"/>
-          <a:stretch>
-            <a:fillRect/>
-          </a:stretch>
-        </p:blipFill>
-        <p:spPr>
-          <a:xfrm>
-            <a:off x="4487" y="80628"/>
-            <a:ext cx="12192000" cy="5949950"/>
-          </a:xfrm>
-          <a:prstGeom prst="rect">
-            <a:avLst/>
-          </a:prstGeom>
-        </p:spPr>
-      </p:pic>
-      <p:sp>
-        <p:nvSpPr>
-          <p:cNvPr id="5" name="Datumsplatzhalter 4">
-            <a:extLst>
-              <a:ext uri="{FF2B5EF4-FFF2-40B4-BE49-F238E27FC236}">
-                <a16:creationId xmlns:a16="http://schemas.microsoft.com/office/drawing/2014/main" id="{1E4BC56F-B08B-47A1-B4B9-A18090D79063}"/>
-              </a:ext>
-            </a:extLst>
-          </p:cNvPr>
-          <p:cNvSpPr>
-            <a:spLocks noGrp="1"/>
-          </p:cNvSpPr>
-          <p:nvPr>
-            <p:ph type="dt" sz="half" idx="11"/>
-          </p:nvPr>
-        </p:nvSpPr>
-        <p:spPr/>
-        <p:txBody>
-          <a:bodyPr/>
-          <a:lstStyle/>
-          <a:p>
-            <a:pPr marL="0" marR="0" lvl="0" indent="0" algn="l" defTabSz="914400" rtl="0" eaLnBrk="1" fontAlgn="auto" latinLnBrk="0" hangingPunct="1">
-              <a:lnSpc>
-                <a:spcPct val="100000"/>
-              </a:lnSpc>
-              <a:spcBef>
-                <a:spcPts val="110"/>
-              </a:spcBef>
-              <a:spcAft>
-                <a:spcPts val="110"/>
-              </a:spcAft>
-              <a:buClrTx/>
-              <a:buSzTx/>
-              <a:buFontTx/>
-              <a:buNone/>
-              <a:tabLst/>
-              <a:defRPr/>
-            </a:pPr>
-            <a:fld id="{C0E33138-ACF4-4AA0-BCDB-3A9F2443B8D9}" type="datetime1">
-              <a:rPr kumimoji="0" lang="en-US" sz="900" b="0" i="0" u="none" strike="noStrike" kern="1200" cap="none" spc="0" normalizeH="0" baseline="0" smtClean="0">
-                <a:ln>
-                  <a:noFill/>
-                </a:ln>
-                <a:solidFill>
-                  <a:srgbClr val="000000"/>
-                </a:solidFill>
-                <a:effectLst/>
-                <a:uLnTx/>
-                <a:uFillTx/>
-                <a:latin typeface="Arial" panose="020B0604020202020204"/>
-                <a:cs typeface="Arial"/>
-              </a:rPr>
-              <a:t>2/22/2022</a:t>
-            </a:fld>
-            <a:endParaRPr kumimoji="0" lang="en-US" sz="900" b="0" i="0" u="none" strike="noStrike" kern="1200" cap="none" spc="0" normalizeH="0" baseline="0">
-              <a:ln>
-                <a:noFill/>
-              </a:ln>
-              <a:solidFill>
-                <a:srgbClr val="000000"/>
-              </a:solidFill>
-              <a:effectLst/>
-              <a:uLnTx/>
-              <a:uFillTx/>
-              <a:latin typeface="Arial" panose="020B0604020202020204"/>
-              <a:cs typeface="Arial"/>
-            </a:endParaRPr>
-          </a:p>
-        </p:txBody>
-      </p:sp>
-      <p:sp>
-        <p:nvSpPr>
-          <p:cNvPr id="6" name="Foliennummernplatzhalter 5">
-            <a:extLst>
-              <a:ext uri="{FF2B5EF4-FFF2-40B4-BE49-F238E27FC236}">
-                <a16:creationId xmlns:a16="http://schemas.microsoft.com/office/drawing/2014/main" id="{37E60DB8-2B52-4970-9032-41E73B37F2A2}"/>
-              </a:ext>
-            </a:extLst>
-          </p:cNvPr>
-          <p:cNvSpPr>
-            <a:spLocks noGrp="1"/>
-          </p:cNvSpPr>
-          <p:nvPr>
-            <p:ph type="sldNum" sz="quarter" idx="12"/>
-          </p:nvPr>
-        </p:nvSpPr>
-        <p:spPr/>
-        <p:txBody>
-          <a:bodyPr/>
-          <a:lstStyle/>
-          <a:p>
-            <a:pPr marL="0" marR="0" lvl="0" indent="0" algn="l" defTabSz="914400" rtl="0" eaLnBrk="1" fontAlgn="auto" latinLnBrk="0" hangingPunct="1">
-              <a:lnSpc>
-                <a:spcPct val="100000"/>
-              </a:lnSpc>
-              <a:spcBef>
-                <a:spcPts val="110"/>
-              </a:spcBef>
-              <a:spcAft>
-                <a:spcPts val="110"/>
-              </a:spcAft>
-              <a:buClrTx/>
-              <a:buSzTx/>
-              <a:buFontTx/>
-              <a:buNone/>
-              <a:tabLst/>
-              <a:defRPr/>
-            </a:pPr>
-            <a:fld id="{D7C0CCF7-DF53-4ADB-AAD8-9742C01AD446}" type="slidenum">
-              <a:rPr kumimoji="0" lang="en-US" sz="900" b="1" i="0" u="none" strike="noStrike" kern="1200" cap="none" spc="0" normalizeH="0" baseline="0" smtClean="0">
-                <a:ln>
-                  <a:noFill/>
-                </a:ln>
-                <a:solidFill>
-                  <a:srgbClr val="000000"/>
-                </a:solidFill>
-                <a:effectLst/>
-                <a:uLnTx/>
-                <a:uFillTx/>
-                <a:latin typeface="Arial" panose="020B0604020202020204"/>
-                <a:cs typeface="Arial"/>
-              </a:rPr>
-              <a:pPr marL="0" marR="0" lvl="0" indent="0" algn="l" defTabSz="914400" rtl="0" eaLnBrk="1" fontAlgn="auto" latinLnBrk="0" hangingPunct="1">
-                <a:lnSpc>
-                  <a:spcPct val="100000"/>
-                </a:lnSpc>
-                <a:spcBef>
-                  <a:spcPts val="110"/>
-                </a:spcBef>
-                <a:spcAft>
-                  <a:spcPts val="110"/>
-                </a:spcAft>
-                <a:buClrTx/>
-                <a:buSzTx/>
-                <a:buFontTx/>
-                <a:buNone/>
-                <a:tabLst/>
-                <a:defRPr/>
-              </a:pPr>
-              <a:t>7</a:t>
-            </a:fld>
-            <a:endParaRPr kumimoji="0" lang="en-US" sz="900" b="1" i="0" u="none" strike="noStrike" kern="1200" cap="none" spc="0" normalizeH="0" baseline="0">
-              <a:ln>
-                <a:noFill/>
-              </a:ln>
-              <a:solidFill>
-                <a:srgbClr val="000000"/>
-              </a:solidFill>
-              <a:effectLst/>
-              <a:uLnTx/>
-              <a:uFillTx/>
-              <a:latin typeface="Arial" panose="020B0604020202020204"/>
-              <a:cs typeface="Arial"/>
-            </a:endParaRPr>
-          </a:p>
-        </p:txBody>
-      </p:sp>
-      <p:sp>
-        <p:nvSpPr>
-          <p:cNvPr id="11" name="Textplatzhalter 10">
-            <a:extLst>
-              <a:ext uri="{FF2B5EF4-FFF2-40B4-BE49-F238E27FC236}">
-                <a16:creationId xmlns:a16="http://schemas.microsoft.com/office/drawing/2014/main" id="{19D7EBED-DD57-4BEF-8EA1-9BE44C2D015A}"/>
-              </a:ext>
-            </a:extLst>
-          </p:cNvPr>
-          <p:cNvSpPr>
-            <a:spLocks noGrp="1"/>
-          </p:cNvSpPr>
-          <p:nvPr>
-            <p:ph type="body" idx="1"/>
-          </p:nvPr>
-        </p:nvSpPr>
-        <p:spPr>
-          <a:xfrm>
-            <a:off x="234887" y="1952625"/>
-            <a:ext cx="11734800" cy="1980431"/>
-          </a:xfrm>
-          <a:solidFill>
-            <a:srgbClr val="FFFFFF">
-              <a:alpha val="80000"/>
-            </a:srgbClr>
-          </a:solidFill>
-        </p:spPr>
-        <p:txBody>
-          <a:bodyPr/>
-          <a:lstStyle/>
-          <a:p>
-            <a:pPr marL="0" indent="0">
-              <a:lnSpc>
-                <a:spcPct val="100000"/>
-              </a:lnSpc>
-              <a:spcBef>
-                <a:spcPts val="600"/>
-              </a:spcBef>
-              <a:buNone/>
-            </a:pPr>
-            <a:r>
-              <a:rPr lang="en-US" b="1" dirty="0"/>
-              <a:t>Article Forecast</a:t>
-            </a:r>
-          </a:p>
-          <a:p>
-            <a:pPr>
-              <a:lnSpc>
-                <a:spcPct val="100000"/>
-              </a:lnSpc>
-              <a:spcBef>
-                <a:spcPts val="600"/>
-              </a:spcBef>
-            </a:pPr>
-            <a:r>
-              <a:rPr lang="en-US" dirty="0"/>
-              <a:t>In the Article Forecast section the results of the forecast run are displayed for the selected article. Additional subsections with further information can be selected below the plot</a:t>
-            </a:r>
-          </a:p>
-          <a:p>
-            <a:pPr>
-              <a:lnSpc>
-                <a:spcPct val="100000"/>
-              </a:lnSpc>
-              <a:spcBef>
-                <a:spcPts val="600"/>
-              </a:spcBef>
-            </a:pPr>
-            <a:r>
-              <a:rPr lang="en-US" dirty="0"/>
-              <a:t>The </a:t>
-            </a:r>
-            <a:r>
-              <a:rPr lang="en-US" b="1" dirty="0"/>
-              <a:t>FBL Results </a:t>
-            </a:r>
-            <a:r>
-              <a:rPr lang="en-US" dirty="0"/>
-              <a:t>subsection (</a:t>
-            </a:r>
-            <a:r>
-              <a:rPr lang="en-US" i="1" dirty="0"/>
-              <a:t>only available when the Feedback Loop has been activated</a:t>
-            </a:r>
-            <a:r>
-              <a:rPr lang="en-US" dirty="0"/>
-              <a:t>) shows the best-fitting forecast level (article / article and customer) and forecast method (aggregation / disaggregation) as well as the best-fitting forecast method per chosen forecast level</a:t>
-            </a:r>
-          </a:p>
-        </p:txBody>
-      </p:sp>
-      <p:sp>
-        <p:nvSpPr>
-          <p:cNvPr id="8" name="Sprechblase: rechteckig mit abgerundeten Ecken 7">
-            <a:extLst>
-              <a:ext uri="{FF2B5EF4-FFF2-40B4-BE49-F238E27FC236}">
-                <a16:creationId xmlns:a16="http://schemas.microsoft.com/office/drawing/2014/main" id="{C4731452-906B-4504-9EC8-69455B2B35FF}"/>
-              </a:ext>
-            </a:extLst>
-          </p:cNvPr>
-          <p:cNvSpPr/>
-          <p:nvPr/>
-        </p:nvSpPr>
-        <p:spPr>
-          <a:xfrm>
-            <a:off x="2135560" y="5733256"/>
-            <a:ext cx="2340260" cy="756084"/>
-          </a:xfrm>
-          <a:prstGeom prst="wedgeRoundRectCallout">
-            <a:avLst>
-              <a:gd name="adj1" fmla="val -62373"/>
-              <a:gd name="adj2" fmla="val -30683"/>
-              <a:gd name="adj3" fmla="val 16667"/>
-            </a:avLst>
-          </a:prstGeom>
-          <a:solidFill>
-            <a:srgbClr val="FFFFCC"/>
-          </a:solidFill>
-          <a:ln>
-            <a:solidFill>
-              <a:schemeClr val="bg1">
-                <a:lumMod val="85000"/>
-              </a:schemeClr>
-            </a:solidFill>
-          </a:ln>
-        </p:spPr>
-        <p:style>
-          <a:lnRef idx="2">
-            <a:schemeClr val="accent1">
-              <a:shade val="50000"/>
-            </a:schemeClr>
-          </a:lnRef>
-          <a:fillRef idx="1">
-            <a:schemeClr val="accent1"/>
-          </a:fillRef>
-          <a:effectRef idx="0">
-            <a:schemeClr val="accent1"/>
-          </a:effectRef>
-          <a:fontRef idx="minor">
-            <a:schemeClr val="lt1"/>
-          </a:fontRef>
-        </p:style>
-        <p:txBody>
-          <a:bodyPr rtlCol="0" anchor="ctr"/>
-          <a:lstStyle/>
-          <a:p>
-            <a:pPr algn="ctr"/>
-            <a:r>
-              <a:rPr lang="en-US" sz="1400" dirty="0">
-                <a:solidFill>
-                  <a:schemeClr val="tx1"/>
-                </a:solidFill>
-              </a:rPr>
-              <a:t>Select a forecast version to show the details on article customer level</a:t>
-            </a:r>
-          </a:p>
-        </p:txBody>
-      </p:sp>
-      <p:sp>
-        <p:nvSpPr>
-          <p:cNvPr id="9" name="Sprechblase: rechteckig mit abgerundeten Ecken 8">
-            <a:extLst>
-              <a:ext uri="{FF2B5EF4-FFF2-40B4-BE49-F238E27FC236}">
-                <a16:creationId xmlns:a16="http://schemas.microsoft.com/office/drawing/2014/main" id="{6BEF4C93-DFF4-499B-ACFD-7C57C269592A}"/>
-              </a:ext>
-            </a:extLst>
-          </p:cNvPr>
-          <p:cNvSpPr/>
-          <p:nvPr/>
-        </p:nvSpPr>
-        <p:spPr>
-          <a:xfrm>
-            <a:off x="6312024" y="5517232"/>
-            <a:ext cx="3096344" cy="756084"/>
-          </a:xfrm>
-          <a:prstGeom prst="wedgeRoundRectCallout">
-            <a:avLst>
-              <a:gd name="adj1" fmla="val -35293"/>
-              <a:gd name="adj2" fmla="val -83370"/>
-              <a:gd name="adj3" fmla="val 16667"/>
-            </a:avLst>
-          </a:prstGeom>
-          <a:solidFill>
-            <a:srgbClr val="FFFFCC"/>
-          </a:solidFill>
-          <a:ln>
-            <a:solidFill>
-              <a:schemeClr val="bg1">
-                <a:lumMod val="85000"/>
-              </a:schemeClr>
-            </a:solidFill>
-          </a:ln>
-        </p:spPr>
-        <p:style>
-          <a:lnRef idx="2">
-            <a:schemeClr val="accent1">
-              <a:shade val="50000"/>
-            </a:schemeClr>
-          </a:lnRef>
-          <a:fillRef idx="1">
-            <a:schemeClr val="accent1"/>
-          </a:fillRef>
-          <a:effectRef idx="0">
-            <a:schemeClr val="accent1"/>
-          </a:effectRef>
-          <a:fontRef idx="minor">
-            <a:schemeClr val="lt1"/>
-          </a:fontRef>
-        </p:style>
-        <p:txBody>
-          <a:bodyPr rtlCol="0" anchor="ctr"/>
-          <a:lstStyle/>
-          <a:p>
-            <a:pPr algn="ctr"/>
-            <a:r>
-              <a:rPr lang="en-US" sz="1400" dirty="0">
-                <a:solidFill>
-                  <a:schemeClr val="tx1"/>
-                </a:solidFill>
-              </a:rPr>
-              <a:t>Select a customer to show the best-fitting and alternative forecasts and plot the historical data and forecast</a:t>
-            </a:r>
-          </a:p>
-        </p:txBody>
-      </p:sp>
-    </p:spTree>
-    <p:extLst>
-      <p:ext uri="{BB962C8B-B14F-4D97-AF65-F5344CB8AC3E}">
-        <p14:creationId xmlns:p14="http://schemas.microsoft.com/office/powerpoint/2010/main" val="236000781"/>
-      </p:ext>
-    </p:extLst>
-  </p:cSld>
-  <p:clrMapOvr>
-    <a:masterClrMapping/>
-  </p:clrMapOvr>
-</p:sld>
-</file>
-
-<file path=ppt/slides/slide8.xml><?xml version="1.0" encoding="utf-8"?>
-<p:sld xmlns:a="http://schemas.openxmlformats.org/drawingml/2006/main" xmlns:r="http://schemas.openxmlformats.org/officeDocument/2006/relationships" xmlns:p="http://schemas.openxmlformats.org/presentationml/2006/main">
-  <p:cSld>
-    <p:spTree>
-      <p:nvGrpSpPr>
-        <p:cNvPr id="1" name=""/>
-        <p:cNvGrpSpPr/>
-        <p:nvPr/>
-      </p:nvGrpSpPr>
-      <p:grpSpPr>
-        <a:xfrm>
-          <a:off x="0" y="0"/>
-          <a:ext cx="0" cy="0"/>
-          <a:chOff x="0" y="0"/>
-          <a:chExt cx="0" cy="0"/>
-        </a:xfrm>
-      </p:grpSpPr>
-      <p:pic>
-        <p:nvPicPr>
-          <p:cNvPr id="4" name="Grafik 3">
-            <a:extLst>
-              <a:ext uri="{FF2B5EF4-FFF2-40B4-BE49-F238E27FC236}">
-                <a16:creationId xmlns:a16="http://schemas.microsoft.com/office/drawing/2014/main" id="{0D19CF01-5316-4A7D-ACBE-DAAA602B7820}"/>
-              </a:ext>
-            </a:extLst>
-          </p:cNvPr>
-          <p:cNvPicPr>
-            <a:picLocks noChangeAspect="1"/>
-          </p:cNvPicPr>
-          <p:nvPr/>
-        </p:nvPicPr>
-        <p:blipFill>
-          <a:blip r:embed="rId2"/>
-          <a:stretch>
-            <a:fillRect/>
-          </a:stretch>
-        </p:blipFill>
-        <p:spPr>
-          <a:xfrm>
-            <a:off x="0" y="80628"/>
-            <a:ext cx="12192000" cy="5949950"/>
-          </a:xfrm>
-          <a:prstGeom prst="rect">
-            <a:avLst/>
-          </a:prstGeom>
-        </p:spPr>
-      </p:pic>
-      <p:sp>
-        <p:nvSpPr>
-          <p:cNvPr id="5" name="Datumsplatzhalter 4">
-            <a:extLst>
-              <a:ext uri="{FF2B5EF4-FFF2-40B4-BE49-F238E27FC236}">
-                <a16:creationId xmlns:a16="http://schemas.microsoft.com/office/drawing/2014/main" id="{1E4BC56F-B08B-47A1-B4B9-A18090D79063}"/>
-              </a:ext>
-            </a:extLst>
-          </p:cNvPr>
-          <p:cNvSpPr>
-            <a:spLocks noGrp="1"/>
-          </p:cNvSpPr>
-          <p:nvPr>
-            <p:ph type="dt" sz="half" idx="11"/>
-          </p:nvPr>
-        </p:nvSpPr>
-        <p:spPr/>
-        <p:txBody>
-          <a:bodyPr/>
-          <a:lstStyle/>
-          <a:p>
-            <a:pPr marL="0" marR="0" lvl="0" indent="0" algn="l" defTabSz="914400" rtl="0" eaLnBrk="1" fontAlgn="auto" latinLnBrk="0" hangingPunct="1">
-              <a:lnSpc>
-                <a:spcPct val="100000"/>
-              </a:lnSpc>
-              <a:spcBef>
-                <a:spcPts val="110"/>
-              </a:spcBef>
-              <a:spcAft>
-                <a:spcPts val="110"/>
-              </a:spcAft>
-              <a:buClrTx/>
-              <a:buSzTx/>
-              <a:buFontTx/>
-              <a:buNone/>
-              <a:tabLst/>
-              <a:defRPr/>
-            </a:pPr>
-            <a:fld id="{C0E33138-ACF4-4AA0-BCDB-3A9F2443B8D9}" type="datetime1">
-              <a:rPr kumimoji="0" lang="en-US" sz="900" b="0" i="0" u="none" strike="noStrike" kern="1200" cap="none" spc="0" normalizeH="0" baseline="0" smtClean="0">
-                <a:ln>
-                  <a:noFill/>
-                </a:ln>
-                <a:solidFill>
-                  <a:srgbClr val="000000"/>
-                </a:solidFill>
-                <a:effectLst/>
-                <a:uLnTx/>
-                <a:uFillTx/>
-                <a:latin typeface="Arial" panose="020B0604020202020204"/>
-                <a:cs typeface="Arial"/>
-              </a:rPr>
-              <a:t>2/22/2022</a:t>
-            </a:fld>
-            <a:endParaRPr kumimoji="0" lang="en-US" sz="900" b="0" i="0" u="none" strike="noStrike" kern="1200" cap="none" spc="0" normalizeH="0" baseline="0">
-              <a:ln>
-                <a:noFill/>
-              </a:ln>
-              <a:solidFill>
-                <a:srgbClr val="000000"/>
-              </a:solidFill>
-              <a:effectLst/>
-              <a:uLnTx/>
-              <a:uFillTx/>
-              <a:latin typeface="Arial" panose="020B0604020202020204"/>
-              <a:cs typeface="Arial"/>
-            </a:endParaRPr>
-          </a:p>
-        </p:txBody>
-      </p:sp>
-      <p:sp>
-        <p:nvSpPr>
-          <p:cNvPr id="6" name="Foliennummernplatzhalter 5">
-            <a:extLst>
-              <a:ext uri="{FF2B5EF4-FFF2-40B4-BE49-F238E27FC236}">
-                <a16:creationId xmlns:a16="http://schemas.microsoft.com/office/drawing/2014/main" id="{37E60DB8-2B52-4970-9032-41E73B37F2A2}"/>
-              </a:ext>
-            </a:extLst>
-          </p:cNvPr>
-          <p:cNvSpPr>
-            <a:spLocks noGrp="1"/>
-          </p:cNvSpPr>
-          <p:nvPr>
-            <p:ph type="sldNum" sz="quarter" idx="12"/>
-          </p:nvPr>
-        </p:nvSpPr>
-        <p:spPr/>
-        <p:txBody>
-          <a:bodyPr/>
-          <a:lstStyle/>
-          <a:p>
-            <a:pPr marL="0" marR="0" lvl="0" indent="0" algn="l" defTabSz="914400" rtl="0" eaLnBrk="1" fontAlgn="auto" latinLnBrk="0" hangingPunct="1">
-              <a:lnSpc>
-                <a:spcPct val="100000"/>
-              </a:lnSpc>
-              <a:spcBef>
-                <a:spcPts val="110"/>
-              </a:spcBef>
-              <a:spcAft>
-                <a:spcPts val="110"/>
-              </a:spcAft>
-              <a:buClrTx/>
-              <a:buSzTx/>
-              <a:buFontTx/>
-              <a:buNone/>
-              <a:tabLst/>
-              <a:defRPr/>
-            </a:pPr>
-            <a:fld id="{D7C0CCF7-DF53-4ADB-AAD8-9742C01AD446}" type="slidenum">
-              <a:rPr kumimoji="0" lang="en-US" sz="900" b="1" i="0" u="none" strike="noStrike" kern="1200" cap="none" spc="0" normalizeH="0" baseline="0" smtClean="0">
-                <a:ln>
-                  <a:noFill/>
-                </a:ln>
-                <a:solidFill>
-                  <a:srgbClr val="000000"/>
-                </a:solidFill>
-                <a:effectLst/>
-                <a:uLnTx/>
-                <a:uFillTx/>
-                <a:latin typeface="Arial" panose="020B0604020202020204"/>
-                <a:cs typeface="Arial"/>
-              </a:rPr>
-              <a:pPr marL="0" marR="0" lvl="0" indent="0" algn="l" defTabSz="914400" rtl="0" eaLnBrk="1" fontAlgn="auto" latinLnBrk="0" hangingPunct="1">
-                <a:lnSpc>
-                  <a:spcPct val="100000"/>
-                </a:lnSpc>
-                <a:spcBef>
-                  <a:spcPts val="110"/>
-                </a:spcBef>
-                <a:spcAft>
-                  <a:spcPts val="110"/>
-                </a:spcAft>
-                <a:buClrTx/>
-                <a:buSzTx/>
-                <a:buFontTx/>
-                <a:buNone/>
-                <a:tabLst/>
-                <a:defRPr/>
-              </a:pPr>
-              <a:t>8</a:t>
-            </a:fld>
-            <a:endParaRPr kumimoji="0" lang="en-US" sz="900" b="1" i="0" u="none" strike="noStrike" kern="1200" cap="none" spc="0" normalizeH="0" baseline="0">
-              <a:ln>
-                <a:noFill/>
-              </a:ln>
-              <a:solidFill>
-                <a:srgbClr val="000000"/>
-              </a:solidFill>
-              <a:effectLst/>
-              <a:uLnTx/>
-              <a:uFillTx/>
-              <a:latin typeface="Arial" panose="020B0604020202020204"/>
-              <a:cs typeface="Arial"/>
-            </a:endParaRPr>
-          </a:p>
-        </p:txBody>
-      </p:sp>
-      <p:sp>
-        <p:nvSpPr>
-          <p:cNvPr id="11" name="Textplatzhalter 10">
-            <a:extLst>
-              <a:ext uri="{FF2B5EF4-FFF2-40B4-BE49-F238E27FC236}">
-                <a16:creationId xmlns:a16="http://schemas.microsoft.com/office/drawing/2014/main" id="{19D7EBED-DD57-4BEF-8EA1-9BE44C2D015A}"/>
-              </a:ext>
-            </a:extLst>
-          </p:cNvPr>
-          <p:cNvSpPr>
-            <a:spLocks noGrp="1"/>
-          </p:cNvSpPr>
-          <p:nvPr>
-            <p:ph type="body" idx="1"/>
-          </p:nvPr>
-        </p:nvSpPr>
-        <p:spPr>
-          <a:xfrm>
-            <a:off x="234887" y="1952625"/>
-            <a:ext cx="11734800" cy="1872419"/>
-          </a:xfrm>
-          <a:solidFill>
-            <a:srgbClr val="FFFFFF">
-              <a:alpha val="80000"/>
-            </a:srgbClr>
-          </a:solidFill>
-        </p:spPr>
-        <p:txBody>
-          <a:bodyPr/>
-          <a:lstStyle/>
-          <a:p>
-            <a:pPr marL="0" indent="0">
-              <a:lnSpc>
-                <a:spcPct val="100000"/>
-              </a:lnSpc>
-              <a:spcBef>
-                <a:spcPts val="600"/>
-              </a:spcBef>
-              <a:buNone/>
-            </a:pPr>
-            <a:r>
-              <a:rPr lang="en-US" b="1" dirty="0"/>
-              <a:t>Article Forecast</a:t>
-            </a:r>
-          </a:p>
-          <a:p>
-            <a:pPr>
-              <a:lnSpc>
-                <a:spcPct val="100000"/>
-              </a:lnSpc>
-              <a:spcBef>
-                <a:spcPts val="600"/>
-              </a:spcBef>
-            </a:pPr>
-            <a:r>
-              <a:rPr lang="en-US" dirty="0"/>
-              <a:t>In the Article Forecast section the results of the forecast run are displayed for the selected article. Additional subsections with further information can be selected below the plot</a:t>
-            </a:r>
-          </a:p>
-          <a:p>
-            <a:pPr>
-              <a:lnSpc>
-                <a:spcPct val="100000"/>
-              </a:lnSpc>
-              <a:spcBef>
-                <a:spcPts val="600"/>
-              </a:spcBef>
-            </a:pPr>
-            <a:r>
-              <a:rPr lang="en-US" dirty="0"/>
               <a:t>The </a:t>
             </a:r>
             <a:r>
@@ -15702,23 +14120,7 @@
             </a:r>
             <a:r>
               <a:rPr lang="en-US" dirty="0"/>
-              <a:t>subsection (</a:t>
-            </a:r>
-            <a:r>
-              <a:rPr lang="en-US" i="1" dirty="0"/>
-              <a:t>only available when the Feedback Loop has </a:t>
-            </a:r>
-            <a:r>
-              <a:rPr lang="en-US" i="1" u="sng" dirty="0"/>
-              <a:t>not</a:t>
-            </a:r>
-            <a:r>
-              <a:rPr lang="en-US" i="1" dirty="0"/>
-              <a:t> been activated</a:t>
-            </a:r>
-            <a:r>
-              <a:rPr lang="en-US" dirty="0"/>
-              <a:t>) shows the best-fitting and alternative forecast methods and their respective accuracy and error</a:t>
+              <a:t>shows the best-fitting and alternative forecast methods and their respective accuracy and error</a:t>
             </a:r>
           </a:p>
         </p:txBody>
@@ -15742,8 +14144,8 @@
           </a:xfrm>
           <a:prstGeom prst="wedgeRoundRectCallout">
             <a:avLst>
-              <a:gd name="adj1" fmla="val -62373"/>
-              <a:gd name="adj2" fmla="val -30683"/>
+              <a:gd name="adj1" fmla="val -67556"/>
+              <a:gd name="adj2" fmla="val -129409"/>
               <a:gd name="adj3" fmla="val 16667"/>
             </a:avLst>
           </a:prstGeom>
@@ -15855,6 +14257,73 @@
           <a:p>
             <a:pPr algn="ctr"/>
             <a:endParaRPr lang="en-US"/>
+          </a:p>
+        </p:txBody>
+      </p:sp>
+      <p:sp>
+        <p:nvSpPr>
+          <p:cNvPr id="10" name="Sprechblase: rechteckig mit abgerundeten Ecken 9">
+            <a:extLst>
+              <a:ext uri="{FF2B5EF4-FFF2-40B4-BE49-F238E27FC236}">
+                <a16:creationId xmlns:a16="http://schemas.microsoft.com/office/drawing/2014/main" id="{6FFE663A-AEA0-4ABA-942C-81874D9BD1BC}"/>
+              </a:ext>
+            </a:extLst>
+          </p:cNvPr>
+          <p:cNvSpPr/>
+          <p:nvPr/>
+        </p:nvSpPr>
+        <p:spPr>
+          <a:xfrm>
+            <a:off x="5879976" y="3592223"/>
+            <a:ext cx="2880320" cy="756084"/>
+          </a:xfrm>
+          <a:prstGeom prst="wedgeRoundRectCallout">
+            <a:avLst>
+              <a:gd name="adj1" fmla="val -56542"/>
+              <a:gd name="adj2" fmla="val 79149"/>
+              <a:gd name="adj3" fmla="val 16667"/>
+            </a:avLst>
+          </a:prstGeom>
+          <a:solidFill>
+            <a:srgbClr val="FFFFCC"/>
+          </a:solidFill>
+          <a:ln>
+            <a:solidFill>
+              <a:schemeClr val="bg1">
+                <a:lumMod val="85000"/>
+              </a:schemeClr>
+            </a:solidFill>
+          </a:ln>
+        </p:spPr>
+        <p:style>
+          <a:lnRef idx="2">
+            <a:schemeClr val="accent1">
+              <a:shade val="50000"/>
+            </a:schemeClr>
+          </a:lnRef>
+          <a:fillRef idx="1">
+            <a:schemeClr val="accent1"/>
+          </a:fillRef>
+          <a:effectRef idx="0">
+            <a:schemeClr val="accent1"/>
+          </a:effectRef>
+          <a:fontRef idx="minor">
+            <a:schemeClr val="lt1"/>
+          </a:fontRef>
+        </p:style>
+        <p:txBody>
+          <a:bodyPr rtlCol="0" anchor="ctr"/>
+          <a:lstStyle/>
+          <a:p>
+            <a:pPr algn="ctr"/>
+            <a:r>
+              <a:rPr lang="en-US" sz="1400" dirty="0">
+                <a:solidFill>
+                  <a:schemeClr val="tx1"/>
+                </a:solidFill>
+              </a:rPr>
+              <a:t>Select a forecast method to explore the forecast errors in the graph on the right</a:t>
+            </a:r>
           </a:p>
         </p:txBody>
       </p:sp>

</xml_diff>

<commit_message>
Manual updated, minor changes in data
</commit_message>
<xml_diff>
--- a/src/assets/ADFUserManual.pptx
+++ b/src/assets/ADFUserManual.pptx
@@ -564,7 +564,7 @@
           <a:p>
             <a:fld id="{1E843078-645D-4158-A787-42F60CFF6D2A}" type="datetimeFigureOut">
               <a:rPr lang="de-DE" smtClean="0"/>
-              <a:t>23.05.2022</a:t>
+              <a:t>30.05.2022</a:t>
             </a:fld>
             <a:endParaRPr lang="de-DE"/>
           </a:p>
@@ -741,7 +741,7 @@
           <a:p>
             <a:fld id="{9E486D6B-7251-4AFE-851B-67A0DE1DAFFC}" type="datetimeFigureOut">
               <a:rPr lang="de-DE" smtClean="0"/>
-              <a:t>23.05.2022</a:t>
+              <a:t>30.05.2022</a:t>
             </a:fld>
             <a:endParaRPr lang="de-DE"/>
           </a:p>
@@ -1048,7 +1048,7 @@
           <a:p>
             <a:fld id="{65010B03-D230-4701-9F37-B6F131066B93}" type="datetime1">
               <a:rPr lang="de-DE" smtClean="0"/>
-              <a:t>23.05.2022</a:t>
+              <a:t>30.05.2022</a:t>
             </a:fld>
             <a:endParaRPr lang="de-DE" dirty="0"/>
           </a:p>
@@ -1385,7 +1385,7 @@
                 <a:latin typeface="Arial" panose="020B0604020202020204"/>
                 <a:cs typeface="Arial"/>
               </a:rPr>
-              <a:t>23.05.2022</a:t>
+              <a:t>30.05.2022</a:t>
             </a:fld>
             <a:endParaRPr kumimoji="0" lang="de-DE" sz="900" b="0" i="0" u="none" strike="noStrike" kern="1200" cap="none" spc="0" normalizeH="0" baseline="0" noProof="0" dirty="0">
               <a:ln>
@@ -1670,7 +1670,7 @@
                 <a:latin typeface="Arial" panose="020B0604020202020204"/>
                 <a:cs typeface="Arial"/>
               </a:rPr>
-              <a:t>23.05.2022</a:t>
+              <a:t>30.05.2022</a:t>
             </a:fld>
             <a:endParaRPr kumimoji="0" lang="de-DE" sz="900" b="0" i="0" u="none" strike="noStrike" kern="1200" cap="none" spc="0" normalizeH="0" baseline="0" noProof="0" dirty="0">
               <a:ln>
@@ -1927,7 +1927,7 @@
                 <a:latin typeface="Arial" panose="020B0604020202020204"/>
                 <a:cs typeface="Arial"/>
               </a:rPr>
-              <a:t>23.05.2022</a:t>
+              <a:t>30.05.2022</a:t>
             </a:fld>
             <a:endParaRPr kumimoji="0" lang="de-DE" sz="900" b="0" i="0" u="none" strike="noStrike" kern="1200" cap="none" spc="0" normalizeH="0" baseline="0" noProof="0" dirty="0">
               <a:ln>
@@ -2336,7 +2336,7 @@
                 <a:latin typeface="Arial" panose="020B0604020202020204"/>
                 <a:cs typeface="Arial"/>
               </a:rPr>
-              <a:t>23.05.2022</a:t>
+              <a:t>30.05.2022</a:t>
             </a:fld>
             <a:endParaRPr kumimoji="0" lang="de-DE" sz="900" b="0" i="0" u="none" strike="noStrike" kern="1200" cap="none" spc="0" normalizeH="0" baseline="0" noProof="0" dirty="0">
               <a:ln>
@@ -2745,7 +2745,7 @@
                 <a:latin typeface="Arial" panose="020B0604020202020204"/>
                 <a:cs typeface="Arial"/>
               </a:rPr>
-              <a:t>23.05.2022</a:t>
+              <a:t>30.05.2022</a:t>
             </a:fld>
             <a:endParaRPr kumimoji="0" lang="de-DE" sz="900" b="0" i="0" u="none" strike="noStrike" kern="1200" cap="none" spc="0" normalizeH="0" baseline="0" noProof="0" dirty="0">
               <a:ln>
@@ -3064,7 +3064,7 @@
                 <a:latin typeface="Arial" panose="020B0604020202020204"/>
                 <a:cs typeface="Arial"/>
               </a:rPr>
-              <a:t>23.05.2022</a:t>
+              <a:t>30.05.2022</a:t>
             </a:fld>
             <a:endParaRPr kumimoji="0" lang="de-DE" sz="900" b="0" i="0" u="none" strike="noStrike" kern="1200" cap="none" spc="0" normalizeH="0" baseline="0" noProof="0" dirty="0">
               <a:ln>
@@ -3411,7 +3411,7 @@
                 <a:latin typeface="Arial" panose="020B0604020202020204"/>
                 <a:cs typeface="Arial"/>
               </a:rPr>
-              <a:t>23.05.2022</a:t>
+              <a:t>30.05.2022</a:t>
             </a:fld>
             <a:endParaRPr kumimoji="0" lang="de-DE" sz="900" b="0" i="0" u="none" strike="noStrike" kern="1200" cap="none" spc="0" normalizeH="0" baseline="0" noProof="0" dirty="0">
               <a:ln>
@@ -3788,7 +3788,7 @@
                 <a:latin typeface="Arial" panose="020B0604020202020204"/>
                 <a:cs typeface="Arial"/>
               </a:rPr>
-              <a:t>23.05.2022</a:t>
+              <a:t>30.05.2022</a:t>
             </a:fld>
             <a:endParaRPr kumimoji="0" lang="de-DE" sz="900" b="0" i="0" u="none" strike="noStrike" kern="1200" cap="none" spc="0" normalizeH="0" baseline="0" noProof="0" dirty="0">
               <a:ln>
@@ -4165,7 +4165,7 @@
                 <a:latin typeface="Arial" panose="020B0604020202020204"/>
                 <a:cs typeface="Arial"/>
               </a:rPr>
-              <a:t>23.05.2022</a:t>
+              <a:t>30.05.2022</a:t>
             </a:fld>
             <a:endParaRPr kumimoji="0" lang="de-DE" sz="900" b="0" i="0" u="none" strike="noStrike" kern="1200" cap="none" spc="0" normalizeH="0" baseline="0" noProof="0" dirty="0">
               <a:ln>
@@ -4574,7 +4574,7 @@
                 <a:latin typeface="Arial" panose="020B0604020202020204"/>
                 <a:cs typeface="Arial"/>
               </a:rPr>
-              <a:t>23.05.2022</a:t>
+              <a:t>30.05.2022</a:t>
             </a:fld>
             <a:endParaRPr kumimoji="0" lang="de-DE" sz="900" b="0" i="0" u="none" strike="noStrike" kern="1200" cap="none" spc="0" normalizeH="0" baseline="0" noProof="0" dirty="0">
               <a:ln>
@@ -5039,7 +5039,7 @@
                 <a:latin typeface="Arial" panose="020B0604020202020204"/>
                 <a:cs typeface="Arial"/>
               </a:rPr>
-              <a:t>23.05.2022</a:t>
+              <a:t>30.05.2022</a:t>
             </a:fld>
             <a:endParaRPr kumimoji="0" lang="de-DE" sz="900" b="0" i="0" u="none" strike="noStrike" kern="1200" cap="none" spc="0" normalizeH="0" baseline="0" noProof="0" dirty="0">
               <a:ln>
@@ -5448,7 +5448,7 @@
                 <a:latin typeface="Arial" panose="020B0604020202020204"/>
                 <a:cs typeface="Arial"/>
               </a:rPr>
-              <a:t>23.05.2022</a:t>
+              <a:t>30.05.2022</a:t>
             </a:fld>
             <a:endParaRPr kumimoji="0" lang="de-DE" sz="900" b="0" i="0" u="none" strike="noStrike" kern="1200" cap="none" spc="0" normalizeH="0" baseline="0" noProof="0" dirty="0">
               <a:ln>
@@ -5919,7 +5919,7 @@
                 <a:latin typeface="Arial" panose="020B0604020202020204"/>
                 <a:cs typeface="Arial"/>
               </a:rPr>
-              <a:t>23.05.2022</a:t>
+              <a:t>30.05.2022</a:t>
             </a:fld>
             <a:endParaRPr kumimoji="0" lang="de-DE" sz="900" b="0" i="0" u="none" strike="noStrike" kern="1200" cap="none" spc="0" normalizeH="0" baseline="0" noProof="0" dirty="0">
               <a:ln>
@@ -6390,7 +6390,7 @@
                 <a:latin typeface="Arial" panose="020B0604020202020204"/>
                 <a:cs typeface="Arial"/>
               </a:rPr>
-              <a:t>23.05.2022</a:t>
+              <a:t>30.05.2022</a:t>
             </a:fld>
             <a:endParaRPr kumimoji="0" lang="de-DE" sz="900" b="0" i="0" u="none" strike="noStrike" kern="1200" cap="none" spc="0" normalizeH="0" baseline="0" noProof="0" dirty="0">
               <a:ln>
@@ -6861,7 +6861,7 @@
                 <a:latin typeface="Arial" panose="020B0604020202020204"/>
                 <a:cs typeface="Arial"/>
               </a:rPr>
-              <a:t>23.05.2022</a:t>
+              <a:t>30.05.2022</a:t>
             </a:fld>
             <a:endParaRPr kumimoji="0" lang="de-DE" sz="900" b="0" i="0" u="none" strike="noStrike" kern="1200" cap="none" spc="0" normalizeH="0" baseline="0" noProof="0" dirty="0">
               <a:ln>
@@ -7394,7 +7394,7 @@
                 <a:latin typeface="Arial" panose="020B0604020202020204"/>
                 <a:cs typeface="Arial"/>
               </a:rPr>
-              <a:t>23.05.2022</a:t>
+              <a:t>30.05.2022</a:t>
             </a:fld>
             <a:endParaRPr kumimoji="0" lang="de-DE" sz="900" b="0" i="0" u="none" strike="noStrike" kern="1200" cap="none" spc="0" normalizeH="0" baseline="0" noProof="0" dirty="0">
               <a:ln>
@@ -7869,7 +7869,7 @@
                 <a:latin typeface="Arial" panose="020B0604020202020204"/>
                 <a:cs typeface="Arial"/>
               </a:rPr>
-              <a:t>23.05.2022</a:t>
+              <a:t>30.05.2022</a:t>
             </a:fld>
             <a:endParaRPr kumimoji="0" lang="de-DE" sz="900" b="0" i="0" u="none" strike="noStrike" kern="1200" cap="none" spc="0" normalizeH="0" baseline="0" noProof="0" dirty="0">
               <a:ln>
@@ -8184,7 +8184,7 @@
                 <a:latin typeface="Arial" panose="020B0604020202020204"/>
                 <a:cs typeface="Arial"/>
               </a:rPr>
-              <a:t>23.05.2022</a:t>
+              <a:t>30.05.2022</a:t>
             </a:fld>
             <a:endParaRPr kumimoji="0" lang="de-DE" sz="900" b="0" i="0" u="none" strike="noStrike" kern="1200" cap="none" spc="0" normalizeH="0" baseline="0" noProof="0" dirty="0">
               <a:ln>
@@ -8561,7 +8561,7 @@
                 <a:latin typeface="Arial" panose="020B0604020202020204"/>
                 <a:cs typeface="Arial"/>
               </a:rPr>
-              <a:t>23.05.2022</a:t>
+              <a:t>30.05.2022</a:t>
             </a:fld>
             <a:endParaRPr kumimoji="0" lang="de-DE" sz="900" b="0" i="0" u="none" strike="noStrike" kern="1200" cap="none" spc="0" normalizeH="0" baseline="0" noProof="0" dirty="0">
               <a:ln>
@@ -8938,7 +8938,7 @@
                 <a:latin typeface="Arial" panose="020B0604020202020204"/>
                 <a:cs typeface="Arial"/>
               </a:rPr>
-              <a:t>23.05.2022</a:t>
+              <a:t>30.05.2022</a:t>
             </a:fld>
             <a:endParaRPr kumimoji="0" lang="de-DE" sz="900" b="0" i="0" u="none" strike="noStrike" kern="1200" cap="none" spc="0" normalizeH="0" baseline="0" noProof="0" dirty="0">
               <a:ln>
@@ -9253,7 +9253,7 @@
                 <a:latin typeface="Arial" panose="020B0604020202020204"/>
                 <a:cs typeface="Arial"/>
               </a:rPr>
-              <a:t>23.05.2022</a:t>
+              <a:t>30.05.2022</a:t>
             </a:fld>
             <a:endParaRPr kumimoji="0" lang="de-DE" sz="900" b="0" i="0" u="none" strike="noStrike" kern="1200" cap="none" spc="0" normalizeH="0" baseline="0" noProof="0" dirty="0">
               <a:ln>
@@ -9568,7 +9568,7 @@
                 <a:latin typeface="Arial" panose="020B0604020202020204"/>
                 <a:cs typeface="Arial"/>
               </a:rPr>
-              <a:t>23.05.2022</a:t>
+              <a:t>30.05.2022</a:t>
             </a:fld>
             <a:endParaRPr kumimoji="0" lang="de-DE" sz="900" b="0" i="0" u="none" strike="noStrike" kern="1200" cap="none" spc="0" normalizeH="0" baseline="0" noProof="0" dirty="0">
               <a:ln>
@@ -9945,7 +9945,7 @@
                 <a:latin typeface="Arial" panose="020B0604020202020204"/>
                 <a:cs typeface="Arial"/>
               </a:rPr>
-              <a:t>23.05.2022</a:t>
+              <a:t>30.05.2022</a:t>
             </a:fld>
             <a:endParaRPr kumimoji="0" lang="de-DE" sz="900" b="0" i="0" u="none" strike="noStrike" kern="1200" cap="none" spc="0" normalizeH="0" baseline="0" noProof="0" dirty="0">
               <a:ln>
@@ -10376,7 +10376,7 @@
           <a:p>
             <a:fld id="{65010B03-D230-4701-9F37-B6F131066B93}" type="datetime1">
               <a:rPr lang="de-DE" smtClean="0"/>
-              <a:t>23.05.2022</a:t>
+              <a:t>30.05.2022</a:t>
             </a:fld>
             <a:endParaRPr lang="de-DE" dirty="0"/>
           </a:p>
@@ -11082,7 +11082,7 @@
                 <a:latin typeface="Arial" panose="020B0604020202020204"/>
                 <a:cs typeface="Arial"/>
               </a:rPr>
-              <a:t>23.05.2022</a:t>
+              <a:t>30.05.2022</a:t>
             </a:fld>
             <a:endParaRPr kumimoji="0" lang="de-DE" sz="900" b="0" i="0" u="none" strike="noStrike" kern="1200" cap="none" spc="0" normalizeH="0" baseline="0" noProof="0" dirty="0">
               <a:ln>
@@ -11951,7 +11951,7 @@
           </p:cNvGraphicFramePr>
           <p:nvPr>
             <p:custDataLst>
-              <p:tags r:id="rId3"/>
+              <p:tags r:id="rId4"/>
             </p:custDataLst>
             <p:extLst>
               <p:ext uri="{D42A27DB-BD31-4B8C-83A1-F6EECF244321}">
@@ -11968,12 +11968,12 @@
           <a:graphicData uri="http://schemas.openxmlformats.org/presentationml/2006/ole">
             <mc:AlternateContent xmlns:mc="http://schemas.openxmlformats.org/markup-compatibility/2006">
               <mc:Choice xmlns:v="urn:schemas-microsoft-com:vml" Requires="v">
-                <p:oleObj name="think-cell Folie" r:id="rId4" imgW="270" imgH="270" progId="TCLayout.ActiveDocument.1">
+                <p:oleObj spid="_x0000_s1027" name="think-cell Folie" r:id="rId5" imgW="270" imgH="270" progId="TCLayout.ActiveDocument.1">
                   <p:embed/>
                 </p:oleObj>
               </mc:Choice>
               <mc:Fallback>
-                <p:oleObj name="think-cell Folie" r:id="rId4" imgW="270" imgH="270" progId="TCLayout.ActiveDocument.1">
+                <p:oleObj name="think-cell Folie" r:id="rId5" imgW="270" imgH="270" progId="TCLayout.ActiveDocument.1">
                   <p:embed/>
                   <p:pic>
                     <p:nvPicPr>
@@ -11982,7 +11982,7 @@
                       <p:nvPr/>
                     </p:nvPicPr>
                     <p:blipFill>
-                      <a:blip r:embed="rId5"/>
+                      <a:blip r:embed="rId6"/>
                       <a:stretch>
                         <a:fillRect/>
                       </a:stretch>
@@ -12386,10 +12386,10 @@
       </p:grpSpPr>
       <p:pic>
         <p:nvPicPr>
-          <p:cNvPr id="7" name="Grafik 6">
-            <a:extLst>
-              <a:ext uri="{FF2B5EF4-FFF2-40B4-BE49-F238E27FC236}">
-                <a16:creationId xmlns:a16="http://schemas.microsoft.com/office/drawing/2014/main" id="{791B5F64-9022-418E-B017-46DE1AA5C500}"/>
+          <p:cNvPr id="3" name="Grafik 2">
+            <a:extLst>
+              <a:ext uri="{FF2B5EF4-FFF2-40B4-BE49-F238E27FC236}">
+                <a16:creationId xmlns:a16="http://schemas.microsoft.com/office/drawing/2014/main" id="{F23D5A0C-44F0-4E3B-9FC4-1A3B8FCBF6CD}"/>
               </a:ext>
             </a:extLst>
           </p:cNvPr>
@@ -12406,8 +12406,8 @@
         </p:blipFill>
         <p:spPr>
           <a:xfrm>
-            <a:off x="0" y="79691"/>
-            <a:ext cx="12192000" cy="3934749"/>
+            <a:off x="0" y="0"/>
+            <a:ext cx="12192000" cy="6143650"/>
           </a:xfrm>
           <a:prstGeom prst="rect">
             <a:avLst/>
@@ -12466,7 +12466,7 @@
                 <a:latin typeface="Arial" panose="020B0604020202020204"/>
                 <a:cs typeface="Arial"/>
               </a:rPr>
-              <a:t>5/23/2022</a:t>
+              <a:t>5/30/2022</a:t>
             </a:fld>
             <a:endParaRPr kumimoji="0" lang="en-US" sz="900" b="0" i="0" u="none" strike="noStrike" kern="1200" cap="none" spc="0" normalizeH="0" baseline="0">
               <a:ln>
@@ -12585,7 +12585,7 @@
         </p:nvSpPr>
         <p:spPr>
           <a:xfrm>
-            <a:off x="3286849" y="2921158"/>
+            <a:off x="3286849" y="2841467"/>
             <a:ext cx="4356485" cy="1159700"/>
           </a:xfrm>
           <a:prstGeom prst="wedgeRoundRectCallout">
@@ -12652,7 +12652,7 @@
         </p:nvSpPr>
         <p:spPr>
           <a:xfrm>
-            <a:off x="6240016" y="181068"/>
+            <a:off x="6240016" y="101377"/>
             <a:ext cx="3215151" cy="1159700"/>
           </a:xfrm>
           <a:prstGeom prst="wedgeRoundRectCallout">
@@ -12723,8 +12723,8 @@
         </p:nvSpPr>
         <p:spPr>
           <a:xfrm>
-            <a:off x="228600" y="4616450"/>
-            <a:ext cx="11734800" cy="1479550"/>
+            <a:off x="228600" y="4581128"/>
+            <a:ext cx="11963400" cy="1479550"/>
           </a:xfrm>
           <a:solidFill>
             <a:srgbClr val="FFFFFF">
@@ -12800,13 +12800,13 @@
         </p:nvSpPr>
         <p:spPr>
           <a:xfrm>
-            <a:off x="97082" y="2384884"/>
-            <a:ext cx="2997587" cy="1116124"/>
+            <a:off x="97082" y="2305192"/>
+            <a:ext cx="2997587" cy="1627863"/>
           </a:xfrm>
           <a:prstGeom prst="wedgeRoundRectCallout">
             <a:avLst>
-              <a:gd name="adj1" fmla="val -2332"/>
-              <a:gd name="adj2" fmla="val -199897"/>
+              <a:gd name="adj1" fmla="val -6810"/>
+              <a:gd name="adj2" fmla="val -153001"/>
               <a:gd name="adj3" fmla="val 16667"/>
             </a:avLst>
           </a:prstGeom>
@@ -12848,7 +12848,7 @@
                   <a:schemeClr val="tx1"/>
                 </a:solidFill>
               </a:rPr>
-              <a:t>The main navigation is in this version of the Inspector tool disabled. Usually, you can find here more statistics about your article forecasts</a:t>
+              <a:t>This is the main navigation of the ADF Inspector. Some menu items are disabled in this simplified version of the Inspector. Usually, you can find there even more statistics about your article forecasts</a:t>
             </a:r>
           </a:p>
         </p:txBody>
@@ -12867,7 +12867,7 @@
         </p:nvSpPr>
         <p:spPr>
           <a:xfrm>
-            <a:off x="7716181" y="2867676"/>
+            <a:off x="7716181" y="2787985"/>
             <a:ext cx="2997588" cy="813352"/>
           </a:xfrm>
           <a:prstGeom prst="wedgeRoundRectCallout">
@@ -12952,10 +12952,10 @@
       </p:grpSpPr>
       <p:pic>
         <p:nvPicPr>
-          <p:cNvPr id="8" name="Grafik 7">
-            <a:extLst>
-              <a:ext uri="{FF2B5EF4-FFF2-40B4-BE49-F238E27FC236}">
-                <a16:creationId xmlns:a16="http://schemas.microsoft.com/office/drawing/2014/main" id="{C1691830-3DA3-4EEA-B7D7-D9338989D757}"/>
+          <p:cNvPr id="3" name="Grafik 2">
+            <a:extLst>
+              <a:ext uri="{FF2B5EF4-FFF2-40B4-BE49-F238E27FC236}">
+                <a16:creationId xmlns:a16="http://schemas.microsoft.com/office/drawing/2014/main" id="{436BBF72-EE3E-419B-9330-F36511121143}"/>
               </a:ext>
             </a:extLst>
           </p:cNvPr>
@@ -12972,8 +12972,8 @@
         </p:blipFill>
         <p:spPr>
           <a:xfrm>
-            <a:off x="-5961" y="84736"/>
-            <a:ext cx="12192000" cy="6019800"/>
+            <a:off x="0" y="0"/>
+            <a:ext cx="12192000" cy="6140450"/>
           </a:xfrm>
           <a:prstGeom prst="rect">
             <a:avLst/>
@@ -13032,7 +13032,7 @@
                 <a:latin typeface="Arial" panose="020B0604020202020204"/>
                 <a:cs typeface="Arial"/>
               </a:rPr>
-              <a:t>5/23/2022</a:t>
+              <a:t>5/30/2022</a:t>
             </a:fld>
             <a:endParaRPr kumimoji="0" lang="en-US" sz="900" b="0" i="0" u="none" strike="noStrike" kern="1200" cap="none" spc="0" normalizeH="0" baseline="0">
               <a:ln>
@@ -13155,7 +13155,7 @@
         </p:nvSpPr>
         <p:spPr>
           <a:xfrm>
-            <a:off x="-5961" y="4613807"/>
+            <a:off x="-5961" y="4529071"/>
             <a:ext cx="12192000" cy="1482193"/>
           </a:xfrm>
           <a:solidFill>
@@ -13234,13 +13234,13 @@
         </p:nvSpPr>
         <p:spPr>
           <a:xfrm>
-            <a:off x="8076220" y="3481343"/>
+            <a:off x="8112224" y="3429000"/>
             <a:ext cx="2772308" cy="549501"/>
           </a:xfrm>
           <a:prstGeom prst="wedgeRoundRectCallout">
             <a:avLst>
-              <a:gd name="adj1" fmla="val -73633"/>
-              <a:gd name="adj2" fmla="val -35969"/>
+              <a:gd name="adj1" fmla="val -76962"/>
+              <a:gd name="adj2" fmla="val -63449"/>
               <a:gd name="adj3" fmla="val 16667"/>
             </a:avLst>
           </a:prstGeom>
@@ -13418,13 +13418,13 @@
         </p:nvSpPr>
         <p:spPr>
           <a:xfrm>
-            <a:off x="5961" y="2420888"/>
+            <a:off x="226800" y="2494161"/>
             <a:ext cx="3240360" cy="1152128"/>
           </a:xfrm>
           <a:prstGeom prst="wedgeRoundRectCallout">
             <a:avLst>
-              <a:gd name="adj1" fmla="val 60795"/>
-              <a:gd name="adj2" fmla="val -82374"/>
+              <a:gd name="adj1" fmla="val 58724"/>
+              <a:gd name="adj2" fmla="val -107859"/>
               <a:gd name="adj3" fmla="val 16667"/>
             </a:avLst>
           </a:prstGeom>
@@ -13501,13 +13501,13 @@
         </p:nvSpPr>
         <p:spPr>
           <a:xfrm>
-            <a:off x="6312024" y="2319671"/>
+            <a:off x="6312024" y="717550"/>
             <a:ext cx="2340260" cy="549501"/>
           </a:xfrm>
           <a:prstGeom prst="wedgeRoundRectCallout">
             <a:avLst>
-              <a:gd name="adj1" fmla="val -47389"/>
-              <a:gd name="adj2" fmla="val -104901"/>
+              <a:gd name="adj1" fmla="val -76783"/>
+              <a:gd name="adj2" fmla="val 79824"/>
               <a:gd name="adj3" fmla="val 16667"/>
             </a:avLst>
           </a:prstGeom>
@@ -13586,10 +13586,10 @@
       </p:grpSpPr>
       <p:pic>
         <p:nvPicPr>
-          <p:cNvPr id="7" name="Grafik 6">
-            <a:extLst>
-              <a:ext uri="{FF2B5EF4-FFF2-40B4-BE49-F238E27FC236}">
-                <a16:creationId xmlns:a16="http://schemas.microsoft.com/office/drawing/2014/main" id="{ECB36397-13ED-448A-ACED-2A2E25BAD6F0}"/>
+          <p:cNvPr id="3" name="Grafik 2">
+            <a:extLst>
+              <a:ext uri="{FF2B5EF4-FFF2-40B4-BE49-F238E27FC236}">
+                <a16:creationId xmlns:a16="http://schemas.microsoft.com/office/drawing/2014/main" id="{76EF76F1-070A-438A-AC53-40A7E5A3C7FE}"/>
               </a:ext>
             </a:extLst>
           </p:cNvPr>
@@ -13606,8 +13606,8 @@
         </p:blipFill>
         <p:spPr>
           <a:xfrm>
-            <a:off x="0" y="111317"/>
-            <a:ext cx="12192000" cy="6070574"/>
+            <a:off x="0" y="0"/>
+            <a:ext cx="12192000" cy="6130943"/>
           </a:xfrm>
           <a:prstGeom prst="rect">
             <a:avLst/>
@@ -13666,7 +13666,7 @@
                 <a:latin typeface="Arial" panose="020B0604020202020204"/>
                 <a:cs typeface="Arial"/>
               </a:rPr>
-              <a:t>5/23/2022</a:t>
+              <a:t>5/30/2022</a:t>
             </a:fld>
             <a:endParaRPr kumimoji="0" lang="en-US" sz="900" b="0" i="0" u="none" strike="noStrike" kern="1200" cap="none" spc="0" normalizeH="0" baseline="0">
               <a:ln>
@@ -13789,7 +13789,7 @@
         </p:nvSpPr>
         <p:spPr>
           <a:xfrm>
-            <a:off x="5961" y="2636912"/>
+            <a:off x="5961" y="2384884"/>
             <a:ext cx="12180078" cy="1224347"/>
           </a:xfrm>
           <a:solidFill>
@@ -13872,10 +13872,10 @@
       </p:grpSpPr>
       <p:pic>
         <p:nvPicPr>
-          <p:cNvPr id="3" name="Grafik 2">
-            <a:extLst>
-              <a:ext uri="{FF2B5EF4-FFF2-40B4-BE49-F238E27FC236}">
-                <a16:creationId xmlns:a16="http://schemas.microsoft.com/office/drawing/2014/main" id="{6BB68CCA-4F88-43CA-81BA-1E8C1A9FE5B7}"/>
+          <p:cNvPr id="4" name="Grafik 3">
+            <a:extLst>
+              <a:ext uri="{FF2B5EF4-FFF2-40B4-BE49-F238E27FC236}">
+                <a16:creationId xmlns:a16="http://schemas.microsoft.com/office/drawing/2014/main" id="{C426D7F6-E52B-48D6-B9B4-9E98D8BEAB27}"/>
               </a:ext>
             </a:extLst>
           </p:cNvPr>
@@ -13884,15 +13884,16 @@
           </p:cNvPicPr>
           <p:nvPr/>
         </p:nvPicPr>
-        <p:blipFill rotWithShape="1">
+        <p:blipFill>
           <a:blip r:embed="rId2"/>
-          <a:srcRect t="1" b="579"/>
-          <a:stretch/>
+          <a:stretch>
+            <a:fillRect/>
+          </a:stretch>
         </p:blipFill>
         <p:spPr>
           <a:xfrm>
-            <a:off x="0" y="80628"/>
-            <a:ext cx="12192000" cy="6012668"/>
+            <a:off x="0" y="-710"/>
+            <a:ext cx="12192000" cy="6143650"/>
           </a:xfrm>
           <a:prstGeom prst="rect">
             <a:avLst/>
@@ -13951,7 +13952,7 @@
                 <a:latin typeface="Arial" panose="020B0604020202020204"/>
                 <a:cs typeface="Arial"/>
               </a:rPr>
-              <a:t>5/23/2022</a:t>
+              <a:t>5/30/2022</a:t>
             </a:fld>
             <a:endParaRPr kumimoji="0" lang="en-US" sz="900" b="0" i="0" u="none" strike="noStrike" kern="1200" cap="none" spc="0" normalizeH="0" baseline="0">
               <a:ln>
@@ -14139,7 +14140,7 @@
         </p:nvSpPr>
         <p:spPr>
           <a:xfrm>
-            <a:off x="2135560" y="5733256"/>
+            <a:off x="2135560" y="5661248"/>
             <a:ext cx="2880320" cy="756084"/>
           </a:xfrm>
           <a:prstGeom prst="wedgeRoundRectCallout">
@@ -14195,7 +14196,7 @@
                   <a:schemeClr val="tx1"/>
                 </a:solidFill>
               </a:rPr>
-              <a:t>backtest</a:t>
+              <a:t>backtesting</a:t>
             </a:r>
             <a:r>
               <a:rPr lang="en-US" sz="1400" dirty="0">
@@ -14274,7 +14275,7 @@
         </p:nvSpPr>
         <p:spPr>
           <a:xfrm>
-            <a:off x="5879976" y="3592223"/>
+            <a:off x="5879976" y="3520215"/>
             <a:ext cx="2880320" cy="756084"/>
           </a:xfrm>
           <a:prstGeom prst="wedgeRoundRectCallout">

</xml_diff>